<commit_message>
Added function cheat sheet. minor updates
</commit_message>
<xml_diff>
--- a/Rmd/img/DataPhases.pptx
+++ b/Rmd/img/DataPhases.pptx
@@ -6,6 +6,8 @@
   </p:sldMasterIdLst>
   <p:sldIdLst>
     <p:sldId id="256" r:id="rId2"/>
+    <p:sldId id="258" r:id="rId3"/>
+    <p:sldId id="257" r:id="rId4"/>
   </p:sldIdLst>
   <p:sldSz cx="12192000" cy="6858000"/>
   <p:notesSz cx="6858000" cy="9144000"/>
@@ -243,7 +245,7 @@
           <a:p>
             <a:fld id="{0FE42C67-9C12-354F-BD80-6EBF4A0EA0C6}" type="datetimeFigureOut">
               <a:rPr lang="en-US" smtClean="0"/>
-              <a:t>6/4/2016</a:t>
+              <a:t>6/5/2016</a:t>
             </a:fld>
             <a:endParaRPr lang="en-US"/>
           </a:p>
@@ -413,7 +415,7 @@
           <a:p>
             <a:fld id="{0FE42C67-9C12-354F-BD80-6EBF4A0EA0C6}" type="datetimeFigureOut">
               <a:rPr lang="en-US" smtClean="0"/>
-              <a:t>6/4/2016</a:t>
+              <a:t>6/5/2016</a:t>
             </a:fld>
             <a:endParaRPr lang="en-US"/>
           </a:p>
@@ -593,7 +595,7 @@
           <a:p>
             <a:fld id="{0FE42C67-9C12-354F-BD80-6EBF4A0EA0C6}" type="datetimeFigureOut">
               <a:rPr lang="en-US" smtClean="0"/>
-              <a:t>6/4/2016</a:t>
+              <a:t>6/5/2016</a:t>
             </a:fld>
             <a:endParaRPr lang="en-US"/>
           </a:p>
@@ -763,7 +765,7 @@
           <a:p>
             <a:fld id="{0FE42C67-9C12-354F-BD80-6EBF4A0EA0C6}" type="datetimeFigureOut">
               <a:rPr lang="en-US" smtClean="0"/>
-              <a:t>6/4/2016</a:t>
+              <a:t>6/5/2016</a:t>
             </a:fld>
             <a:endParaRPr lang="en-US"/>
           </a:p>
@@ -1009,7 +1011,7 @@
           <a:p>
             <a:fld id="{0FE42C67-9C12-354F-BD80-6EBF4A0EA0C6}" type="datetimeFigureOut">
               <a:rPr lang="en-US" smtClean="0"/>
-              <a:t>6/4/2016</a:t>
+              <a:t>6/5/2016</a:t>
             </a:fld>
             <a:endParaRPr lang="en-US"/>
           </a:p>
@@ -1241,7 +1243,7 @@
           <a:p>
             <a:fld id="{0FE42C67-9C12-354F-BD80-6EBF4A0EA0C6}" type="datetimeFigureOut">
               <a:rPr lang="en-US" smtClean="0"/>
-              <a:t>6/4/2016</a:t>
+              <a:t>6/5/2016</a:t>
             </a:fld>
             <a:endParaRPr lang="en-US"/>
           </a:p>
@@ -1608,7 +1610,7 @@
           <a:p>
             <a:fld id="{0FE42C67-9C12-354F-BD80-6EBF4A0EA0C6}" type="datetimeFigureOut">
               <a:rPr lang="en-US" smtClean="0"/>
-              <a:t>6/4/2016</a:t>
+              <a:t>6/5/2016</a:t>
             </a:fld>
             <a:endParaRPr lang="en-US"/>
           </a:p>
@@ -1726,7 +1728,7 @@
           <a:p>
             <a:fld id="{0FE42C67-9C12-354F-BD80-6EBF4A0EA0C6}" type="datetimeFigureOut">
               <a:rPr lang="en-US" smtClean="0"/>
-              <a:t>6/4/2016</a:t>
+              <a:t>6/5/2016</a:t>
             </a:fld>
             <a:endParaRPr lang="en-US"/>
           </a:p>
@@ -1821,7 +1823,7 @@
           <a:p>
             <a:fld id="{0FE42C67-9C12-354F-BD80-6EBF4A0EA0C6}" type="datetimeFigureOut">
               <a:rPr lang="en-US" smtClean="0"/>
-              <a:t>6/4/2016</a:t>
+              <a:t>6/5/2016</a:t>
             </a:fld>
             <a:endParaRPr lang="en-US"/>
           </a:p>
@@ -2098,7 +2100,7 @@
           <a:p>
             <a:fld id="{0FE42C67-9C12-354F-BD80-6EBF4A0EA0C6}" type="datetimeFigureOut">
               <a:rPr lang="en-US" smtClean="0"/>
-              <a:t>6/4/2016</a:t>
+              <a:t>6/5/2016</a:t>
             </a:fld>
             <a:endParaRPr lang="en-US"/>
           </a:p>
@@ -2351,7 +2353,7 @@
           <a:p>
             <a:fld id="{0FE42C67-9C12-354F-BD80-6EBF4A0EA0C6}" type="datetimeFigureOut">
               <a:rPr lang="en-US" smtClean="0"/>
-              <a:t>6/4/2016</a:t>
+              <a:t>6/5/2016</a:t>
             </a:fld>
             <a:endParaRPr lang="en-US"/>
           </a:p>
@@ -2564,7 +2566,7 @@
           <a:p>
             <a:fld id="{0FE42C67-9C12-354F-BD80-6EBF4A0EA0C6}" type="datetimeFigureOut">
               <a:rPr lang="en-US" smtClean="0"/>
-              <a:t>6/4/2016</a:t>
+              <a:t>6/5/2016</a:t>
             </a:fld>
             <a:endParaRPr lang="en-US"/>
           </a:p>
@@ -3157,8 +3159,8 @@
         </p:nvSpPr>
         <p:spPr>
           <a:xfrm>
-            <a:off x="2886517" y="431100"/>
-            <a:ext cx="5194179" cy="523220"/>
+            <a:off x="4415227" y="431100"/>
+            <a:ext cx="1994007" cy="523220"/>
           </a:xfrm>
           <a:prstGeom prst="rect">
             <a:avLst/>
@@ -3173,11 +3175,11 @@
           <a:p>
             <a:r>
               <a:rPr lang="en-US" sz="2800" b="1" dirty="0" smtClean="0"/>
-              <a:t>Data Phases and main </a:t>
-            </a:r>
-            <a:r>
-              <a:rPr lang="en-US" sz="2800" b="1" smtClean="0"/>
-              <a:t>R packages</a:t>
+              <a:t>Data </a:t>
+            </a:r>
+            <a:r>
+              <a:rPr lang="en-US" sz="2800" b="1" dirty="0" smtClean="0"/>
+              <a:t>Phases</a:t>
             </a:r>
             <a:endParaRPr lang="en-US" sz="2800" b="1" dirty="0"/>
           </a:p>
@@ -3437,6 +3439,504 @@
           </a:fontRef>
         </p:style>
       </p:cxnSp>
+    </p:spTree>
+    <p:extLst>
+      <p:ext uri="{BB962C8B-B14F-4D97-AF65-F5344CB8AC3E}">
+        <p14:creationId xmlns:p14="http://schemas.microsoft.com/office/powerpoint/2010/main" val="1907704606"/>
+      </p:ext>
+    </p:extLst>
+  </p:cSld>
+  <p:clrMapOvr>
+    <a:masterClrMapping/>
+  </p:clrMapOvr>
+</p:sld>
+</file>
+
+<file path=ppt/slides/slide2.xml><?xml version="1.0" encoding="utf-8"?>
+<p:sld xmlns:a="http://schemas.openxmlformats.org/drawingml/2006/main" xmlns:r="http://schemas.openxmlformats.org/officeDocument/2006/relationships" xmlns:p="http://schemas.openxmlformats.org/presentationml/2006/main">
+  <p:cSld>
+    <p:spTree>
+      <p:nvGrpSpPr>
+        <p:cNvPr id="1" name=""/>
+        <p:cNvGrpSpPr/>
+        <p:nvPr/>
+      </p:nvGrpSpPr>
+      <p:grpSpPr>
+        <a:xfrm>
+          <a:off x="0" y="0"/>
+          <a:ext cx="0" cy="0"/>
+          <a:chOff x="0" y="0"/>
+          <a:chExt cx="0" cy="0"/>
+        </a:xfrm>
+      </p:grpSpPr>
+      <p:sp>
+        <p:nvSpPr>
+          <p:cNvPr id="6" name="TextBox 5"/>
+          <p:cNvSpPr txBox="1"/>
+          <p:nvPr/>
+        </p:nvSpPr>
+        <p:spPr>
+          <a:xfrm>
+            <a:off x="2988488" y="2897200"/>
+            <a:ext cx="587020" cy="369332"/>
+          </a:xfrm>
+          <a:prstGeom prst="rect">
+            <a:avLst/>
+          </a:prstGeom>
+          <a:noFill/>
+        </p:spPr>
+        <p:txBody>
+          <a:bodyPr wrap="none" rtlCol="0">
+            <a:spAutoFit/>
+          </a:bodyPr>
+          <a:lstStyle/>
+          <a:p>
+            <a:r>
+              <a:rPr lang="en-US" b="1" dirty="0" smtClean="0"/>
+              <a:t>Tidy</a:t>
+            </a:r>
+            <a:endParaRPr lang="en-US" b="1" dirty="0"/>
+          </a:p>
+        </p:txBody>
+      </p:sp>
+      <p:sp>
+        <p:nvSpPr>
+          <p:cNvPr id="7" name="TextBox 6"/>
+          <p:cNvSpPr txBox="1"/>
+          <p:nvPr/>
+        </p:nvSpPr>
+        <p:spPr>
+          <a:xfrm>
+            <a:off x="1751934" y="2897200"/>
+            <a:ext cx="841897" cy="369332"/>
+          </a:xfrm>
+          <a:prstGeom prst="rect">
+            <a:avLst/>
+          </a:prstGeom>
+          <a:noFill/>
+        </p:spPr>
+        <p:txBody>
+          <a:bodyPr wrap="none" rtlCol="0">
+            <a:spAutoFit/>
+          </a:bodyPr>
+          <a:lstStyle/>
+          <a:p>
+            <a:r>
+              <a:rPr lang="en-US" b="1" dirty="0" smtClean="0"/>
+              <a:t>Import</a:t>
+            </a:r>
+            <a:endParaRPr lang="en-US" b="1" dirty="0"/>
+          </a:p>
+        </p:txBody>
+      </p:sp>
+      <p:sp>
+        <p:nvSpPr>
+          <p:cNvPr id="8" name="TextBox 7"/>
+          <p:cNvSpPr txBox="1"/>
+          <p:nvPr/>
+        </p:nvSpPr>
+        <p:spPr>
+          <a:xfrm>
+            <a:off x="4235979" y="2897200"/>
+            <a:ext cx="1153329" cy="369332"/>
+          </a:xfrm>
+          <a:prstGeom prst="rect">
+            <a:avLst/>
+          </a:prstGeom>
+          <a:noFill/>
+        </p:spPr>
+        <p:txBody>
+          <a:bodyPr wrap="none" rtlCol="0">
+            <a:spAutoFit/>
+          </a:bodyPr>
+          <a:lstStyle/>
+          <a:p>
+            <a:r>
+              <a:rPr lang="en-US" b="1" dirty="0" smtClean="0"/>
+              <a:t>Transform</a:t>
+            </a:r>
+            <a:endParaRPr lang="en-US" b="1" dirty="0"/>
+          </a:p>
+        </p:txBody>
+      </p:sp>
+      <p:sp>
+        <p:nvSpPr>
+          <p:cNvPr id="9" name="TextBox 8"/>
+          <p:cNvSpPr txBox="1"/>
+          <p:nvPr/>
+        </p:nvSpPr>
+        <p:spPr>
+          <a:xfrm>
+            <a:off x="5483607" y="2133704"/>
+            <a:ext cx="1024639" cy="369332"/>
+          </a:xfrm>
+          <a:prstGeom prst="rect">
+            <a:avLst/>
+          </a:prstGeom>
+          <a:noFill/>
+        </p:spPr>
+        <p:txBody>
+          <a:bodyPr wrap="none" rtlCol="0">
+            <a:spAutoFit/>
+          </a:bodyPr>
+          <a:lstStyle/>
+          <a:p>
+            <a:r>
+              <a:rPr lang="en-US" b="1" dirty="0" err="1" smtClean="0"/>
+              <a:t>Visualise</a:t>
+            </a:r>
+            <a:endParaRPr lang="en-US" b="1" dirty="0"/>
+          </a:p>
+        </p:txBody>
+      </p:sp>
+      <p:sp>
+        <p:nvSpPr>
+          <p:cNvPr id="10" name="TextBox 9"/>
+          <p:cNvSpPr txBox="1"/>
+          <p:nvPr/>
+        </p:nvSpPr>
+        <p:spPr>
+          <a:xfrm>
+            <a:off x="5587801" y="3667423"/>
+            <a:ext cx="805029" cy="369332"/>
+          </a:xfrm>
+          <a:prstGeom prst="rect">
+            <a:avLst/>
+          </a:prstGeom>
+          <a:noFill/>
+        </p:spPr>
+        <p:txBody>
+          <a:bodyPr wrap="none" rtlCol="0">
+            <a:spAutoFit/>
+          </a:bodyPr>
+          <a:lstStyle/>
+          <a:p>
+            <a:r>
+              <a:rPr lang="en-US" b="1" dirty="0" smtClean="0"/>
+              <a:t>Model</a:t>
+            </a:r>
+            <a:endParaRPr lang="en-US" b="1" dirty="0"/>
+          </a:p>
+        </p:txBody>
+      </p:sp>
+      <p:sp>
+        <p:nvSpPr>
+          <p:cNvPr id="11" name="TextBox 10"/>
+          <p:cNvSpPr txBox="1"/>
+          <p:nvPr/>
+        </p:nvSpPr>
+        <p:spPr>
+          <a:xfrm>
+            <a:off x="7438391" y="2897200"/>
+            <a:ext cx="1507592" cy="369332"/>
+          </a:xfrm>
+          <a:prstGeom prst="rect">
+            <a:avLst/>
+          </a:prstGeom>
+          <a:noFill/>
+        </p:spPr>
+        <p:txBody>
+          <a:bodyPr wrap="none" rtlCol="0">
+            <a:spAutoFit/>
+          </a:bodyPr>
+          <a:lstStyle/>
+          <a:p>
+            <a:r>
+              <a:rPr lang="en-US" b="1" dirty="0" smtClean="0"/>
+              <a:t>Communicate</a:t>
+            </a:r>
+            <a:endParaRPr lang="en-US" b="1" dirty="0"/>
+          </a:p>
+        </p:txBody>
+      </p:sp>
+      <p:sp>
+        <p:nvSpPr>
+          <p:cNvPr id="12" name="TextBox 11"/>
+          <p:cNvSpPr txBox="1"/>
+          <p:nvPr/>
+        </p:nvSpPr>
+        <p:spPr>
+          <a:xfrm>
+            <a:off x="2886517" y="431100"/>
+            <a:ext cx="5194179" cy="523220"/>
+          </a:xfrm>
+          <a:prstGeom prst="rect">
+            <a:avLst/>
+          </a:prstGeom>
+          <a:noFill/>
+        </p:spPr>
+        <p:txBody>
+          <a:bodyPr wrap="none" rtlCol="0">
+            <a:spAutoFit/>
+          </a:bodyPr>
+          <a:lstStyle/>
+          <a:p>
+            <a:r>
+              <a:rPr lang="en-US" sz="2800" b="1" dirty="0" smtClean="0"/>
+              <a:t>Data Phases and main </a:t>
+            </a:r>
+            <a:r>
+              <a:rPr lang="en-US" sz="2800" b="1" smtClean="0"/>
+              <a:t>R packages</a:t>
+            </a:r>
+            <a:endParaRPr lang="en-US" sz="2800" b="1" dirty="0"/>
+          </a:p>
+        </p:txBody>
+      </p:sp>
+      <p:cxnSp>
+        <p:nvCxnSpPr>
+          <p:cNvPr id="14" name="Straight Arrow Connector 13"/>
+          <p:cNvCxnSpPr/>
+          <p:nvPr/>
+        </p:nvCxnSpPr>
+        <p:spPr>
+          <a:xfrm>
+            <a:off x="2579405" y="3081866"/>
+            <a:ext cx="409083" cy="0"/>
+          </a:xfrm>
+          <a:prstGeom prst="straightConnector1">
+            <a:avLst/>
+          </a:prstGeom>
+          <a:ln>
+            <a:tailEnd type="triangle"/>
+          </a:ln>
+        </p:spPr>
+        <p:style>
+          <a:lnRef idx="1">
+            <a:schemeClr val="accent1"/>
+          </a:lnRef>
+          <a:fillRef idx="0">
+            <a:schemeClr val="accent1"/>
+          </a:fillRef>
+          <a:effectRef idx="0">
+            <a:schemeClr val="accent1"/>
+          </a:effectRef>
+          <a:fontRef idx="minor">
+            <a:schemeClr val="tx1"/>
+          </a:fontRef>
+        </p:style>
+      </p:cxnSp>
+      <p:cxnSp>
+        <p:nvCxnSpPr>
+          <p:cNvPr id="15" name="Straight Arrow Connector 14"/>
+          <p:cNvCxnSpPr>
+            <a:stCxn id="6" idx="3"/>
+            <a:endCxn id="8" idx="1"/>
+          </p:cNvCxnSpPr>
+          <p:nvPr/>
+        </p:nvCxnSpPr>
+        <p:spPr>
+          <a:xfrm>
+            <a:off x="3575508" y="3081866"/>
+            <a:ext cx="660471" cy="0"/>
+          </a:xfrm>
+          <a:prstGeom prst="straightConnector1">
+            <a:avLst/>
+          </a:prstGeom>
+          <a:ln>
+            <a:tailEnd type="triangle"/>
+          </a:ln>
+        </p:spPr>
+        <p:style>
+          <a:lnRef idx="1">
+            <a:schemeClr val="accent1"/>
+          </a:lnRef>
+          <a:fillRef idx="0">
+            <a:schemeClr val="accent1"/>
+          </a:fillRef>
+          <a:effectRef idx="0">
+            <a:schemeClr val="accent1"/>
+          </a:effectRef>
+          <a:fontRef idx="minor">
+            <a:schemeClr val="tx1"/>
+          </a:fontRef>
+        </p:style>
+      </p:cxnSp>
+      <p:cxnSp>
+        <p:nvCxnSpPr>
+          <p:cNvPr id="50" name="Straight Arrow Connector 49"/>
+          <p:cNvCxnSpPr>
+            <a:stCxn id="57" idx="6"/>
+            <a:endCxn id="11" idx="1"/>
+          </p:cNvCxnSpPr>
+          <p:nvPr/>
+        </p:nvCxnSpPr>
+        <p:spPr>
+          <a:xfrm>
+            <a:off x="7023054" y="3081866"/>
+            <a:ext cx="415337" cy="0"/>
+          </a:xfrm>
+          <a:prstGeom prst="straightConnector1">
+            <a:avLst/>
+          </a:prstGeom>
+          <a:ln>
+            <a:tailEnd type="triangle"/>
+          </a:ln>
+        </p:spPr>
+        <p:style>
+          <a:lnRef idx="1">
+            <a:schemeClr val="accent1"/>
+          </a:lnRef>
+          <a:fillRef idx="0">
+            <a:schemeClr val="accent1"/>
+          </a:fillRef>
+          <a:effectRef idx="0">
+            <a:schemeClr val="accent1"/>
+          </a:effectRef>
+          <a:fontRef idx="minor">
+            <a:schemeClr val="tx1"/>
+          </a:fontRef>
+        </p:style>
+      </p:cxnSp>
+      <p:sp>
+        <p:nvSpPr>
+          <p:cNvPr id="57" name="Oval 56"/>
+          <p:cNvSpPr/>
+          <p:nvPr/>
+        </p:nvSpPr>
+        <p:spPr>
+          <a:xfrm>
+            <a:off x="3955616" y="1548147"/>
+            <a:ext cx="3067438" cy="3067438"/>
+          </a:xfrm>
+          <a:prstGeom prst="ellipse">
+            <a:avLst/>
+          </a:prstGeom>
+          <a:noFill/>
+        </p:spPr>
+        <p:style>
+          <a:lnRef idx="2">
+            <a:schemeClr val="accent1">
+              <a:shade val="50000"/>
+            </a:schemeClr>
+          </a:lnRef>
+          <a:fillRef idx="1">
+            <a:schemeClr val="accent1"/>
+          </a:fillRef>
+          <a:effectRef idx="0">
+            <a:schemeClr val="accent1"/>
+          </a:effectRef>
+          <a:fontRef idx="minor">
+            <a:schemeClr val="lt1"/>
+          </a:fontRef>
+        </p:style>
+        <p:txBody>
+          <a:bodyPr rtlCol="0" anchor="ctr"/>
+          <a:lstStyle/>
+          <a:p>
+            <a:pPr algn="ctr"/>
+            <a:endParaRPr lang="en-US"/>
+          </a:p>
+        </p:txBody>
+      </p:sp>
+      <p:cxnSp>
+        <p:nvCxnSpPr>
+          <p:cNvPr id="79" name="Straight Arrow Connector 78"/>
+          <p:cNvCxnSpPr>
+            <a:stCxn id="8" idx="0"/>
+            <a:endCxn id="9" idx="1"/>
+          </p:cNvCxnSpPr>
+          <p:nvPr/>
+        </p:nvCxnSpPr>
+        <p:spPr>
+          <a:xfrm flipV="1">
+            <a:off x="4812644" y="2318370"/>
+            <a:ext cx="670963" cy="578830"/>
+          </a:xfrm>
+          <a:prstGeom prst="straightConnector1">
+            <a:avLst/>
+          </a:prstGeom>
+          <a:ln>
+            <a:tailEnd type="triangle"/>
+          </a:ln>
+        </p:spPr>
+        <p:style>
+          <a:lnRef idx="1">
+            <a:schemeClr val="accent1"/>
+          </a:lnRef>
+          <a:fillRef idx="0">
+            <a:schemeClr val="accent1"/>
+          </a:fillRef>
+          <a:effectRef idx="0">
+            <a:schemeClr val="accent1"/>
+          </a:effectRef>
+          <a:fontRef idx="minor">
+            <a:schemeClr val="tx1"/>
+          </a:fontRef>
+        </p:style>
+      </p:cxnSp>
+      <p:cxnSp>
+        <p:nvCxnSpPr>
+          <p:cNvPr id="82" name="Straight Arrow Connector 81"/>
+          <p:cNvCxnSpPr>
+            <a:stCxn id="9" idx="2"/>
+            <a:endCxn id="10" idx="0"/>
+          </p:cNvCxnSpPr>
+          <p:nvPr/>
+        </p:nvCxnSpPr>
+        <p:spPr>
+          <a:xfrm flipH="1">
+            <a:off x="5990316" y="2503036"/>
+            <a:ext cx="5611" cy="1164387"/>
+          </a:xfrm>
+          <a:prstGeom prst="straightConnector1">
+            <a:avLst/>
+          </a:prstGeom>
+          <a:ln>
+            <a:tailEnd type="triangle"/>
+          </a:ln>
+        </p:spPr>
+        <p:style>
+          <a:lnRef idx="1">
+            <a:schemeClr val="accent1"/>
+          </a:lnRef>
+          <a:fillRef idx="0">
+            <a:schemeClr val="accent1"/>
+          </a:fillRef>
+          <a:effectRef idx="0">
+            <a:schemeClr val="accent1"/>
+          </a:effectRef>
+          <a:fontRef idx="minor">
+            <a:schemeClr val="tx1"/>
+          </a:fontRef>
+        </p:style>
+      </p:cxnSp>
+      <p:cxnSp>
+        <p:nvCxnSpPr>
+          <p:cNvPr id="85" name="Straight Arrow Connector 84"/>
+          <p:cNvCxnSpPr>
+            <a:stCxn id="10" idx="1"/>
+            <a:endCxn id="8" idx="2"/>
+          </p:cNvCxnSpPr>
+          <p:nvPr/>
+        </p:nvCxnSpPr>
+        <p:spPr>
+          <a:xfrm flipH="1" flipV="1">
+            <a:off x="4812644" y="3266532"/>
+            <a:ext cx="775157" cy="585557"/>
+          </a:xfrm>
+          <a:prstGeom prst="straightConnector1">
+            <a:avLst/>
+          </a:prstGeom>
+          <a:ln>
+            <a:tailEnd type="triangle"/>
+          </a:ln>
+        </p:spPr>
+        <p:style>
+          <a:lnRef idx="1">
+            <a:schemeClr val="accent1"/>
+          </a:lnRef>
+          <a:fillRef idx="0">
+            <a:schemeClr val="accent1"/>
+          </a:fillRef>
+          <a:effectRef idx="0">
+            <a:schemeClr val="accent1"/>
+          </a:effectRef>
+          <a:fontRef idx="minor">
+            <a:schemeClr val="tx1"/>
+          </a:fontRef>
+        </p:style>
+      </p:cxnSp>
       <p:sp>
         <p:nvSpPr>
           <p:cNvPr id="91" name="TextBox 90"/>
@@ -3521,8 +4021,8 @@
         </p:nvSpPr>
         <p:spPr>
           <a:xfrm>
-            <a:off x="5587801" y="1787260"/>
-            <a:ext cx="686406" cy="461665"/>
+            <a:off x="5587801" y="1873089"/>
+            <a:ext cx="686406" cy="276999"/>
           </a:xfrm>
           <a:prstGeom prst="rect">
             <a:avLst/>
@@ -3543,7 +4043,35 @@
               </a:rPr>
               <a:t>ggplot2</a:t>
             </a:r>
-          </a:p>
+            <a:endParaRPr lang="en-US" sz="1200" dirty="0" smtClean="0">
+              <a:latin typeface="Monaco" charset="0"/>
+              <a:ea typeface="Monaco" charset="0"/>
+              <a:cs typeface="Monaco" charset="0"/>
+            </a:endParaRPr>
+          </a:p>
+        </p:txBody>
+      </p:sp>
+      <p:sp>
+        <p:nvSpPr>
+          <p:cNvPr id="19" name="TextBox 18"/>
+          <p:cNvSpPr txBox="1"/>
+          <p:nvPr/>
+        </p:nvSpPr>
+        <p:spPr>
+          <a:xfrm>
+            <a:off x="7789134" y="3220365"/>
+            <a:ext cx="649537" cy="276999"/>
+          </a:xfrm>
+          <a:prstGeom prst="rect">
+            <a:avLst/>
+          </a:prstGeom>
+          <a:noFill/>
+        </p:spPr>
+        <p:txBody>
+          <a:bodyPr wrap="none" rtlCol="0">
+            <a:spAutoFit/>
+          </a:bodyPr>
+          <a:lstStyle/>
           <a:p>
             <a:r>
               <a:rPr lang="en-US" sz="1200" dirty="0" err="1" smtClean="0">
@@ -3551,7 +4079,7 @@
                 <a:ea typeface="Monaco" charset="0"/>
                 <a:cs typeface="Monaco" charset="0"/>
               </a:rPr>
-              <a:t>plotly</a:t>
+              <a:t>knitr</a:t>
             </a:r>
             <a:endParaRPr lang="en-US" sz="1200" dirty="0">
               <a:latin typeface="Monaco" charset="0"/>
@@ -3561,16 +4089,46 @@
           </a:p>
         </p:txBody>
       </p:sp>
-      <p:sp>
-        <p:nvSpPr>
-          <p:cNvPr id="19" name="TextBox 18"/>
+    </p:spTree>
+    <p:extLst>
+      <p:ext uri="{BB962C8B-B14F-4D97-AF65-F5344CB8AC3E}">
+        <p14:creationId xmlns:p14="http://schemas.microsoft.com/office/powerpoint/2010/main" val="2597207131"/>
+      </p:ext>
+    </p:extLst>
+  </p:cSld>
+  <p:clrMapOvr>
+    <a:masterClrMapping/>
+  </p:clrMapOvr>
+</p:sld>
+</file>
+
+<file path=ppt/slides/slide3.xml><?xml version="1.0" encoding="utf-8"?>
+<p:sld xmlns:a="http://schemas.openxmlformats.org/drawingml/2006/main" xmlns:r="http://schemas.openxmlformats.org/officeDocument/2006/relationships" xmlns:p="http://schemas.openxmlformats.org/presentationml/2006/main">
+  <p:cSld>
+    <p:spTree>
+      <p:nvGrpSpPr>
+        <p:cNvPr id="1" name=""/>
+        <p:cNvGrpSpPr/>
+        <p:nvPr/>
+      </p:nvGrpSpPr>
+      <p:grpSpPr>
+        <a:xfrm>
+          <a:off x="0" y="0"/>
+          <a:ext cx="0" cy="0"/>
+          <a:chOff x="0" y="0"/>
+          <a:chExt cx="0" cy="0"/>
+        </a:xfrm>
+      </p:grpSpPr>
+      <p:sp>
+        <p:nvSpPr>
+          <p:cNvPr id="6" name="TextBox 5"/>
           <p:cNvSpPr txBox="1"/>
           <p:nvPr/>
         </p:nvSpPr>
         <p:spPr>
           <a:xfrm>
-            <a:off x="7789134" y="3220365"/>
-            <a:ext cx="649537" cy="276999"/>
+            <a:off x="3629014" y="2958593"/>
+            <a:ext cx="587020" cy="369332"/>
           </a:xfrm>
           <a:prstGeom prst="rect">
             <a:avLst/>
@@ -3584,12 +4142,531 @@
           <a:lstStyle/>
           <a:p>
             <a:r>
+              <a:rPr lang="en-US" b="1" dirty="0" smtClean="0"/>
+              <a:t>Tidy</a:t>
+            </a:r>
+            <a:endParaRPr lang="en-US" b="1" dirty="0"/>
+          </a:p>
+        </p:txBody>
+      </p:sp>
+      <p:sp>
+        <p:nvSpPr>
+          <p:cNvPr id="7" name="TextBox 6"/>
+          <p:cNvSpPr txBox="1"/>
+          <p:nvPr/>
+        </p:nvSpPr>
+        <p:spPr>
+          <a:xfrm>
+            <a:off x="2392460" y="2958593"/>
+            <a:ext cx="841897" cy="369332"/>
+          </a:xfrm>
+          <a:prstGeom prst="rect">
+            <a:avLst/>
+          </a:prstGeom>
+          <a:noFill/>
+        </p:spPr>
+        <p:txBody>
+          <a:bodyPr wrap="none" rtlCol="0">
+            <a:spAutoFit/>
+          </a:bodyPr>
+          <a:lstStyle/>
+          <a:p>
+            <a:r>
+              <a:rPr lang="en-US" b="1" dirty="0" smtClean="0"/>
+              <a:t>Import</a:t>
+            </a:r>
+            <a:endParaRPr lang="en-US" b="1" dirty="0"/>
+          </a:p>
+        </p:txBody>
+      </p:sp>
+      <p:sp>
+        <p:nvSpPr>
+          <p:cNvPr id="8" name="TextBox 7"/>
+          <p:cNvSpPr txBox="1"/>
+          <p:nvPr/>
+        </p:nvSpPr>
+        <p:spPr>
+          <a:xfrm>
+            <a:off x="4743186" y="2958593"/>
+            <a:ext cx="1153329" cy="369332"/>
+          </a:xfrm>
+          <a:prstGeom prst="rect">
+            <a:avLst/>
+          </a:prstGeom>
+          <a:noFill/>
+        </p:spPr>
+        <p:txBody>
+          <a:bodyPr wrap="none" rtlCol="0">
+            <a:spAutoFit/>
+          </a:bodyPr>
+          <a:lstStyle/>
+          <a:p>
+            <a:r>
+              <a:rPr lang="en-US" b="1" dirty="0" smtClean="0"/>
+              <a:t>Transform</a:t>
+            </a:r>
+            <a:endParaRPr lang="en-US" b="1" dirty="0"/>
+          </a:p>
+        </p:txBody>
+      </p:sp>
+      <p:sp>
+        <p:nvSpPr>
+          <p:cNvPr id="9" name="TextBox 8"/>
+          <p:cNvSpPr txBox="1"/>
+          <p:nvPr/>
+        </p:nvSpPr>
+        <p:spPr>
+          <a:xfrm>
+            <a:off x="6350823" y="2195097"/>
+            <a:ext cx="1024639" cy="369332"/>
+          </a:xfrm>
+          <a:prstGeom prst="rect">
+            <a:avLst/>
+          </a:prstGeom>
+          <a:noFill/>
+        </p:spPr>
+        <p:txBody>
+          <a:bodyPr wrap="none" rtlCol="0">
+            <a:spAutoFit/>
+          </a:bodyPr>
+          <a:lstStyle/>
+          <a:p>
+            <a:r>
+              <a:rPr lang="en-US" b="1" dirty="0" err="1" smtClean="0"/>
+              <a:t>Visualise</a:t>
+            </a:r>
+            <a:endParaRPr lang="en-US" b="1" dirty="0"/>
+          </a:p>
+        </p:txBody>
+      </p:sp>
+      <p:sp>
+        <p:nvSpPr>
+          <p:cNvPr id="10" name="TextBox 9"/>
+          <p:cNvSpPr txBox="1"/>
+          <p:nvPr/>
+        </p:nvSpPr>
+        <p:spPr>
+          <a:xfrm>
+            <a:off x="6455017" y="3728816"/>
+            <a:ext cx="805029" cy="369332"/>
+          </a:xfrm>
+          <a:prstGeom prst="rect">
+            <a:avLst/>
+          </a:prstGeom>
+          <a:noFill/>
+        </p:spPr>
+        <p:txBody>
+          <a:bodyPr wrap="none" rtlCol="0">
+            <a:spAutoFit/>
+          </a:bodyPr>
+          <a:lstStyle/>
+          <a:p>
+            <a:r>
+              <a:rPr lang="en-US" b="1" dirty="0" smtClean="0"/>
+              <a:t>Model</a:t>
+            </a:r>
+            <a:endParaRPr lang="en-US" b="1" dirty="0"/>
+          </a:p>
+        </p:txBody>
+      </p:sp>
+      <p:sp>
+        <p:nvSpPr>
+          <p:cNvPr id="11" name="TextBox 10"/>
+          <p:cNvSpPr txBox="1"/>
+          <p:nvPr/>
+        </p:nvSpPr>
+        <p:spPr>
+          <a:xfrm>
+            <a:off x="8078917" y="2958593"/>
+            <a:ext cx="1507592" cy="369332"/>
+          </a:xfrm>
+          <a:prstGeom prst="rect">
+            <a:avLst/>
+          </a:prstGeom>
+          <a:noFill/>
+        </p:spPr>
+        <p:txBody>
+          <a:bodyPr wrap="none" rtlCol="0">
+            <a:spAutoFit/>
+          </a:bodyPr>
+          <a:lstStyle/>
+          <a:p>
+            <a:r>
+              <a:rPr lang="en-US" b="1" dirty="0" smtClean="0"/>
+              <a:t>Communicate</a:t>
+            </a:r>
+            <a:endParaRPr lang="en-US" b="1" dirty="0"/>
+          </a:p>
+        </p:txBody>
+      </p:sp>
+      <p:sp>
+        <p:nvSpPr>
+          <p:cNvPr id="12" name="TextBox 11"/>
+          <p:cNvSpPr txBox="1"/>
+          <p:nvPr/>
+        </p:nvSpPr>
+        <p:spPr>
+          <a:xfrm>
+            <a:off x="2886517" y="258808"/>
+            <a:ext cx="4941930" cy="523220"/>
+          </a:xfrm>
+          <a:prstGeom prst="rect">
+            <a:avLst/>
+          </a:prstGeom>
+          <a:noFill/>
+        </p:spPr>
+        <p:txBody>
+          <a:bodyPr wrap="none" rtlCol="0">
+            <a:spAutoFit/>
+          </a:bodyPr>
+          <a:lstStyle/>
+          <a:p>
+            <a:r>
+              <a:rPr lang="en-US" sz="2800" b="1" dirty="0" smtClean="0"/>
+              <a:t>Data Phases and main functions</a:t>
+            </a:r>
+            <a:endParaRPr lang="en-US" sz="2800" b="1" dirty="0"/>
+          </a:p>
+        </p:txBody>
+      </p:sp>
+      <p:cxnSp>
+        <p:nvCxnSpPr>
+          <p:cNvPr id="14" name="Straight Arrow Connector 13"/>
+          <p:cNvCxnSpPr/>
+          <p:nvPr/>
+        </p:nvCxnSpPr>
+        <p:spPr>
+          <a:xfrm>
+            <a:off x="3219931" y="3143259"/>
+            <a:ext cx="409083" cy="0"/>
+          </a:xfrm>
+          <a:prstGeom prst="straightConnector1">
+            <a:avLst/>
+          </a:prstGeom>
+          <a:ln>
+            <a:solidFill>
+              <a:schemeClr val="bg1">
+                <a:lumMod val="95000"/>
+              </a:schemeClr>
+            </a:solidFill>
+            <a:tailEnd type="triangle"/>
+          </a:ln>
+        </p:spPr>
+        <p:style>
+          <a:lnRef idx="1">
+            <a:schemeClr val="accent1"/>
+          </a:lnRef>
+          <a:fillRef idx="0">
+            <a:schemeClr val="accent1"/>
+          </a:fillRef>
+          <a:effectRef idx="0">
+            <a:schemeClr val="accent1"/>
+          </a:effectRef>
+          <a:fontRef idx="minor">
+            <a:schemeClr val="tx1"/>
+          </a:fontRef>
+        </p:style>
+      </p:cxnSp>
+      <p:cxnSp>
+        <p:nvCxnSpPr>
+          <p:cNvPr id="15" name="Straight Arrow Connector 14"/>
+          <p:cNvCxnSpPr>
+            <a:stCxn id="6" idx="3"/>
+            <a:endCxn id="8" idx="1"/>
+          </p:cNvCxnSpPr>
+          <p:nvPr/>
+        </p:nvCxnSpPr>
+        <p:spPr>
+          <a:xfrm>
+            <a:off x="4216034" y="3143259"/>
+            <a:ext cx="527152" cy="0"/>
+          </a:xfrm>
+          <a:prstGeom prst="straightConnector1">
+            <a:avLst/>
+          </a:prstGeom>
+          <a:ln>
+            <a:solidFill>
+              <a:schemeClr val="bg1">
+                <a:lumMod val="95000"/>
+              </a:schemeClr>
+            </a:solidFill>
+            <a:tailEnd type="triangle"/>
+          </a:ln>
+        </p:spPr>
+        <p:style>
+          <a:lnRef idx="1">
+            <a:schemeClr val="accent1"/>
+          </a:lnRef>
+          <a:fillRef idx="0">
+            <a:schemeClr val="accent1"/>
+          </a:fillRef>
+          <a:effectRef idx="0">
+            <a:schemeClr val="accent1"/>
+          </a:effectRef>
+          <a:fontRef idx="minor">
+            <a:schemeClr val="tx1"/>
+          </a:fontRef>
+        </p:style>
+      </p:cxnSp>
+      <p:cxnSp>
+        <p:nvCxnSpPr>
+          <p:cNvPr id="50" name="Straight Arrow Connector 49"/>
+          <p:cNvCxnSpPr>
+            <a:stCxn id="57" idx="6"/>
+            <a:endCxn id="11" idx="1"/>
+          </p:cNvCxnSpPr>
+          <p:nvPr/>
+        </p:nvCxnSpPr>
+        <p:spPr>
+          <a:xfrm>
+            <a:off x="7422718" y="3143259"/>
+            <a:ext cx="656199" cy="0"/>
+          </a:xfrm>
+          <a:prstGeom prst="straightConnector1">
+            <a:avLst/>
+          </a:prstGeom>
+          <a:ln>
+            <a:solidFill>
+              <a:schemeClr val="bg1">
+                <a:lumMod val="95000"/>
+              </a:schemeClr>
+            </a:solidFill>
+            <a:tailEnd type="triangle"/>
+          </a:ln>
+        </p:spPr>
+        <p:style>
+          <a:lnRef idx="1">
+            <a:schemeClr val="accent1"/>
+          </a:lnRef>
+          <a:fillRef idx="0">
+            <a:schemeClr val="accent1"/>
+          </a:fillRef>
+          <a:effectRef idx="0">
+            <a:schemeClr val="accent1"/>
+          </a:effectRef>
+          <a:fontRef idx="minor">
+            <a:schemeClr val="tx1"/>
+          </a:fontRef>
+        </p:style>
+      </p:cxnSp>
+      <p:sp>
+        <p:nvSpPr>
+          <p:cNvPr id="57" name="Oval 56"/>
+          <p:cNvSpPr/>
+          <p:nvPr/>
+        </p:nvSpPr>
+        <p:spPr>
+          <a:xfrm>
+            <a:off x="4722451" y="1793125"/>
+            <a:ext cx="2700267" cy="2700267"/>
+          </a:xfrm>
+          <a:prstGeom prst="ellipse">
+            <a:avLst/>
+          </a:prstGeom>
+          <a:noFill/>
+          <a:ln w="9525">
+            <a:solidFill>
+              <a:schemeClr val="bg1">
+                <a:lumMod val="95000"/>
+              </a:schemeClr>
+            </a:solidFill>
+          </a:ln>
+        </p:spPr>
+        <p:style>
+          <a:lnRef idx="2">
+            <a:schemeClr val="accent1">
+              <a:shade val="50000"/>
+            </a:schemeClr>
+          </a:lnRef>
+          <a:fillRef idx="1">
+            <a:schemeClr val="accent1"/>
+          </a:fillRef>
+          <a:effectRef idx="0">
+            <a:schemeClr val="accent1"/>
+          </a:effectRef>
+          <a:fontRef idx="minor">
+            <a:schemeClr val="lt1"/>
+          </a:fontRef>
+        </p:style>
+        <p:txBody>
+          <a:bodyPr rtlCol="0" anchor="ctr"/>
+          <a:lstStyle/>
+          <a:p>
+            <a:pPr algn="ctr"/>
+            <a:endParaRPr lang="en-US"/>
+          </a:p>
+        </p:txBody>
+      </p:sp>
+      <p:cxnSp>
+        <p:nvCxnSpPr>
+          <p:cNvPr id="79" name="Straight Arrow Connector 78"/>
+          <p:cNvCxnSpPr>
+            <a:stCxn id="8" idx="0"/>
+            <a:endCxn id="9" idx="1"/>
+          </p:cNvCxnSpPr>
+          <p:nvPr/>
+        </p:nvCxnSpPr>
+        <p:spPr>
+          <a:xfrm flipV="1">
+            <a:off x="5319851" y="2379763"/>
+            <a:ext cx="1030972" cy="578830"/>
+          </a:xfrm>
+          <a:prstGeom prst="straightConnector1">
+            <a:avLst/>
+          </a:prstGeom>
+          <a:ln>
+            <a:solidFill>
+              <a:schemeClr val="bg1">
+                <a:lumMod val="95000"/>
+              </a:schemeClr>
+            </a:solidFill>
+            <a:tailEnd type="triangle"/>
+          </a:ln>
+        </p:spPr>
+        <p:style>
+          <a:lnRef idx="1">
+            <a:schemeClr val="accent1"/>
+          </a:lnRef>
+          <a:fillRef idx="0">
+            <a:schemeClr val="accent1"/>
+          </a:fillRef>
+          <a:effectRef idx="0">
+            <a:schemeClr val="accent1"/>
+          </a:effectRef>
+          <a:fontRef idx="minor">
+            <a:schemeClr val="tx1"/>
+          </a:fontRef>
+        </p:style>
+      </p:cxnSp>
+      <p:cxnSp>
+        <p:nvCxnSpPr>
+          <p:cNvPr id="82" name="Straight Arrow Connector 81"/>
+          <p:cNvCxnSpPr>
+            <a:stCxn id="9" idx="2"/>
+            <a:endCxn id="10" idx="0"/>
+          </p:cNvCxnSpPr>
+          <p:nvPr/>
+        </p:nvCxnSpPr>
+        <p:spPr>
+          <a:xfrm flipH="1">
+            <a:off x="6857532" y="2564429"/>
+            <a:ext cx="5611" cy="1164387"/>
+          </a:xfrm>
+          <a:prstGeom prst="straightConnector1">
+            <a:avLst/>
+          </a:prstGeom>
+          <a:ln>
+            <a:solidFill>
+              <a:schemeClr val="bg1">
+                <a:lumMod val="95000"/>
+              </a:schemeClr>
+            </a:solidFill>
+            <a:tailEnd type="triangle"/>
+          </a:ln>
+        </p:spPr>
+        <p:style>
+          <a:lnRef idx="1">
+            <a:schemeClr val="accent1"/>
+          </a:lnRef>
+          <a:fillRef idx="0">
+            <a:schemeClr val="accent1"/>
+          </a:fillRef>
+          <a:effectRef idx="0">
+            <a:schemeClr val="accent1"/>
+          </a:effectRef>
+          <a:fontRef idx="minor">
+            <a:schemeClr val="tx1"/>
+          </a:fontRef>
+        </p:style>
+      </p:cxnSp>
+      <p:cxnSp>
+        <p:nvCxnSpPr>
+          <p:cNvPr id="85" name="Straight Arrow Connector 84"/>
+          <p:cNvCxnSpPr>
+            <a:stCxn id="10" idx="1"/>
+            <a:endCxn id="8" idx="2"/>
+          </p:cNvCxnSpPr>
+          <p:nvPr/>
+        </p:nvCxnSpPr>
+        <p:spPr>
+          <a:xfrm flipH="1" flipV="1">
+            <a:off x="5319851" y="3327925"/>
+            <a:ext cx="1135166" cy="585557"/>
+          </a:xfrm>
+          <a:prstGeom prst="straightConnector1">
+            <a:avLst/>
+          </a:prstGeom>
+          <a:ln>
+            <a:solidFill>
+              <a:schemeClr val="bg1">
+                <a:lumMod val="95000"/>
+              </a:schemeClr>
+            </a:solidFill>
+            <a:tailEnd type="triangle"/>
+          </a:ln>
+        </p:spPr>
+        <p:style>
+          <a:lnRef idx="1">
+            <a:schemeClr val="accent1"/>
+          </a:lnRef>
+          <a:fillRef idx="0">
+            <a:schemeClr val="accent1"/>
+          </a:fillRef>
+          <a:effectRef idx="0">
+            <a:schemeClr val="accent1"/>
+          </a:effectRef>
+          <a:fontRef idx="minor">
+            <a:schemeClr val="tx1"/>
+          </a:fontRef>
+        </p:style>
+      </p:cxnSp>
+      <p:sp>
+        <p:nvSpPr>
+          <p:cNvPr id="91" name="TextBox 90"/>
+          <p:cNvSpPr txBox="1"/>
+          <p:nvPr/>
+        </p:nvSpPr>
+        <p:spPr>
+          <a:xfrm>
+            <a:off x="2378666" y="3213367"/>
+            <a:ext cx="968535" cy="461665"/>
+          </a:xfrm>
+          <a:prstGeom prst="rect">
+            <a:avLst/>
+          </a:prstGeom>
+          <a:noFill/>
+        </p:spPr>
+        <p:txBody>
+          <a:bodyPr wrap="none" rtlCol="0">
+            <a:spAutoFit/>
+          </a:bodyPr>
+          <a:lstStyle/>
+          <a:p>
+            <a:r>
               <a:rPr lang="en-US" sz="1200" dirty="0" err="1" smtClean="0">
                 <a:latin typeface="Monaco" charset="0"/>
                 <a:ea typeface="Monaco" charset="0"/>
                 <a:cs typeface="Monaco" charset="0"/>
               </a:rPr>
-              <a:t>knitr</a:t>
+              <a:t>read.table</a:t>
+            </a:r>
+            <a:r>
+              <a:rPr lang="en-US" sz="1200" dirty="0" smtClean="0">
+                <a:latin typeface="Monaco" charset="0"/>
+                <a:ea typeface="Monaco" charset="0"/>
+                <a:cs typeface="Monaco" charset="0"/>
+              </a:rPr>
+              <a:t>()</a:t>
+            </a:r>
+          </a:p>
+          <a:p>
+            <a:r>
+              <a:rPr lang="en-US" sz="1200" dirty="0" smtClean="0">
+                <a:latin typeface="Monaco" charset="0"/>
+                <a:ea typeface="Monaco" charset="0"/>
+                <a:cs typeface="Monaco" charset="0"/>
+              </a:rPr>
+              <a:t>read.csv()</a:t>
             </a:r>
             <a:endParaRPr lang="en-US" sz="1200" dirty="0">
               <a:latin typeface="Monaco" charset="0"/>
@@ -3599,10 +4676,1334 @@
           </a:p>
         </p:txBody>
       </p:sp>
+      <p:sp>
+        <p:nvSpPr>
+          <p:cNvPr id="20" name="TextBox 19"/>
+          <p:cNvSpPr txBox="1"/>
+          <p:nvPr/>
+        </p:nvSpPr>
+        <p:spPr>
+          <a:xfrm>
+            <a:off x="3475769" y="3213367"/>
+            <a:ext cx="1260281" cy="1015663"/>
+          </a:xfrm>
+          <a:prstGeom prst="rect">
+            <a:avLst/>
+          </a:prstGeom>
+          <a:noFill/>
+        </p:spPr>
+        <p:txBody>
+          <a:bodyPr wrap="none" rtlCol="0">
+            <a:spAutoFit/>
+          </a:bodyPr>
+          <a:lstStyle/>
+          <a:p>
+            <a:r>
+              <a:rPr lang="en-US" sz="1200" dirty="0" err="1">
+                <a:latin typeface="Monaco" charset="0"/>
+                <a:ea typeface="Monaco" charset="0"/>
+                <a:cs typeface="Monaco" charset="0"/>
+              </a:rPr>
+              <a:t>tidyr</a:t>
+            </a:r>
+            <a:r>
+              <a:rPr lang="en-US" sz="1200" dirty="0" smtClean="0">
+                <a:latin typeface="Monaco" charset="0"/>
+                <a:ea typeface="Monaco" charset="0"/>
+                <a:cs typeface="Monaco" charset="0"/>
+              </a:rPr>
+              <a:t>::unite()</a:t>
+            </a:r>
+            <a:endParaRPr lang="en-US" sz="1200" dirty="0">
+              <a:latin typeface="Monaco" charset="0"/>
+              <a:ea typeface="Monaco" charset="0"/>
+              <a:cs typeface="Monaco" charset="0"/>
+            </a:endParaRPr>
+          </a:p>
+          <a:p>
+            <a:r>
+              <a:rPr lang="en-US" sz="1200" dirty="0" err="1">
+                <a:latin typeface="Monaco" charset="0"/>
+                <a:ea typeface="Monaco" charset="0"/>
+                <a:cs typeface="Monaco" charset="0"/>
+              </a:rPr>
+              <a:t>tidyr</a:t>
+            </a:r>
+            <a:r>
+              <a:rPr lang="en-US" sz="1200" dirty="0" smtClean="0">
+                <a:latin typeface="Monaco" charset="0"/>
+                <a:ea typeface="Monaco" charset="0"/>
+                <a:cs typeface="Monaco" charset="0"/>
+              </a:rPr>
+              <a:t>::separate()</a:t>
+            </a:r>
+            <a:endParaRPr lang="en-US" sz="1200" dirty="0" smtClean="0">
+              <a:latin typeface="Monaco" charset="0"/>
+              <a:ea typeface="Monaco" charset="0"/>
+              <a:cs typeface="Monaco" charset="0"/>
+            </a:endParaRPr>
+          </a:p>
+          <a:p>
+            <a:r>
+              <a:rPr lang="en-US" sz="1200" dirty="0" err="1" smtClean="0">
+                <a:latin typeface="Monaco" charset="0"/>
+                <a:ea typeface="Monaco" charset="0"/>
+                <a:cs typeface="Monaco" charset="0"/>
+              </a:rPr>
+              <a:t>tidyr</a:t>
+            </a:r>
+            <a:r>
+              <a:rPr lang="en-US" sz="1200" dirty="0" smtClean="0">
+                <a:latin typeface="Monaco" charset="0"/>
+                <a:ea typeface="Monaco" charset="0"/>
+                <a:cs typeface="Monaco" charset="0"/>
+              </a:rPr>
+              <a:t>::gather()</a:t>
+            </a:r>
+          </a:p>
+          <a:p>
+            <a:r>
+              <a:rPr lang="en-US" sz="1200" dirty="0" err="1">
+                <a:latin typeface="Monaco" charset="0"/>
+                <a:ea typeface="Monaco" charset="0"/>
+                <a:cs typeface="Monaco" charset="0"/>
+              </a:rPr>
+              <a:t>tidyr</a:t>
+            </a:r>
+            <a:r>
+              <a:rPr lang="en-US" sz="1200" dirty="0" smtClean="0">
+                <a:latin typeface="Monaco" charset="0"/>
+                <a:ea typeface="Monaco" charset="0"/>
+                <a:cs typeface="Monaco" charset="0"/>
+              </a:rPr>
+              <a:t>::spread</a:t>
+            </a:r>
+            <a:r>
+              <a:rPr lang="en-US" sz="1200" dirty="0" smtClean="0">
+                <a:latin typeface="Monaco" charset="0"/>
+                <a:ea typeface="Monaco" charset="0"/>
+                <a:cs typeface="Monaco" charset="0"/>
+              </a:rPr>
+              <a:t>()</a:t>
+            </a:r>
+          </a:p>
+          <a:p>
+            <a:endParaRPr lang="en-US" sz="1200" dirty="0">
+              <a:latin typeface="Monaco" charset="0"/>
+              <a:ea typeface="Monaco" charset="0"/>
+              <a:cs typeface="Monaco" charset="0"/>
+            </a:endParaRPr>
+          </a:p>
+        </p:txBody>
+      </p:sp>
+      <p:sp>
+        <p:nvSpPr>
+          <p:cNvPr id="21" name="TextBox 20"/>
+          <p:cNvSpPr txBox="1"/>
+          <p:nvPr/>
+        </p:nvSpPr>
+        <p:spPr>
+          <a:xfrm>
+            <a:off x="2374477" y="2029161"/>
+            <a:ext cx="1048492" cy="369332"/>
+          </a:xfrm>
+          <a:prstGeom prst="rect">
+            <a:avLst/>
+          </a:prstGeom>
+          <a:noFill/>
+        </p:spPr>
+        <p:txBody>
+          <a:bodyPr wrap="none" rtlCol="0">
+            <a:spAutoFit/>
+          </a:bodyPr>
+          <a:lstStyle/>
+          <a:p>
+            <a:r>
+              <a:rPr lang="en-US" b="1" dirty="0" smtClean="0"/>
+              <a:t>Packages</a:t>
+            </a:r>
+            <a:endParaRPr lang="en-US" b="1" dirty="0"/>
+          </a:p>
+        </p:txBody>
+      </p:sp>
+      <p:sp>
+        <p:nvSpPr>
+          <p:cNvPr id="22" name="TextBox 21"/>
+          <p:cNvSpPr txBox="1"/>
+          <p:nvPr/>
+        </p:nvSpPr>
+        <p:spPr>
+          <a:xfrm>
+            <a:off x="2374477" y="2379763"/>
+            <a:ext cx="1386918" cy="461665"/>
+          </a:xfrm>
+          <a:prstGeom prst="rect">
+            <a:avLst/>
+          </a:prstGeom>
+          <a:noFill/>
+        </p:spPr>
+        <p:txBody>
+          <a:bodyPr wrap="none" rtlCol="0">
+            <a:spAutoFit/>
+          </a:bodyPr>
+          <a:lstStyle/>
+          <a:p>
+            <a:r>
+              <a:rPr lang="en-US" sz="1200" dirty="0" err="1" smtClean="0">
+                <a:latin typeface="Monaco" charset="0"/>
+                <a:ea typeface="Monaco" charset="0"/>
+                <a:cs typeface="Monaco" charset="0"/>
+              </a:rPr>
+              <a:t>install.packages</a:t>
+            </a:r>
+            <a:r>
+              <a:rPr lang="en-US" sz="1200" dirty="0" smtClean="0">
+                <a:latin typeface="Monaco" charset="0"/>
+                <a:ea typeface="Monaco" charset="0"/>
+                <a:cs typeface="Monaco" charset="0"/>
+              </a:rPr>
+              <a:t>()</a:t>
+            </a:r>
+          </a:p>
+          <a:p>
+            <a:r>
+              <a:rPr lang="en-US" sz="1200" dirty="0" smtClean="0">
+                <a:latin typeface="Monaco" charset="0"/>
+                <a:ea typeface="Monaco" charset="0"/>
+                <a:cs typeface="Monaco" charset="0"/>
+              </a:rPr>
+              <a:t>library()</a:t>
+            </a:r>
+            <a:endParaRPr lang="en-US" sz="1200" dirty="0">
+              <a:latin typeface="Monaco" charset="0"/>
+              <a:ea typeface="Monaco" charset="0"/>
+              <a:cs typeface="Monaco" charset="0"/>
+            </a:endParaRPr>
+          </a:p>
+        </p:txBody>
+      </p:sp>
+      <p:sp>
+        <p:nvSpPr>
+          <p:cNvPr id="23" name="TextBox 22"/>
+          <p:cNvSpPr txBox="1"/>
+          <p:nvPr/>
+        </p:nvSpPr>
+        <p:spPr>
+          <a:xfrm>
+            <a:off x="2374477" y="3863435"/>
+            <a:ext cx="726481" cy="369332"/>
+          </a:xfrm>
+          <a:prstGeom prst="rect">
+            <a:avLst/>
+          </a:prstGeom>
+          <a:noFill/>
+        </p:spPr>
+        <p:txBody>
+          <a:bodyPr wrap="none" rtlCol="0">
+            <a:spAutoFit/>
+          </a:bodyPr>
+          <a:lstStyle/>
+          <a:p>
+            <a:r>
+              <a:rPr lang="en-US" b="1" dirty="0" smtClean="0"/>
+              <a:t>“See”</a:t>
+            </a:r>
+            <a:endParaRPr lang="en-US" b="1" dirty="0"/>
+          </a:p>
+        </p:txBody>
+      </p:sp>
+      <p:sp>
+        <p:nvSpPr>
+          <p:cNvPr id="24" name="TextBox 23"/>
+          <p:cNvSpPr txBox="1"/>
+          <p:nvPr/>
+        </p:nvSpPr>
+        <p:spPr>
+          <a:xfrm>
+            <a:off x="2374477" y="4135246"/>
+            <a:ext cx="627095" cy="646331"/>
+          </a:xfrm>
+          <a:prstGeom prst="rect">
+            <a:avLst/>
+          </a:prstGeom>
+          <a:noFill/>
+        </p:spPr>
+        <p:txBody>
+          <a:bodyPr wrap="none" rtlCol="0">
+            <a:spAutoFit/>
+          </a:bodyPr>
+          <a:lstStyle/>
+          <a:p>
+            <a:r>
+              <a:rPr lang="en-US" sz="1200" dirty="0" smtClean="0">
+                <a:latin typeface="Monaco" charset="0"/>
+                <a:ea typeface="Monaco" charset="0"/>
+                <a:cs typeface="Monaco" charset="0"/>
+              </a:rPr>
+              <a:t>View()</a:t>
+            </a:r>
+          </a:p>
+          <a:p>
+            <a:r>
+              <a:rPr lang="en-US" sz="1200" dirty="0" smtClean="0">
+                <a:latin typeface="Monaco" charset="0"/>
+                <a:ea typeface="Monaco" charset="0"/>
+                <a:cs typeface="Monaco" charset="0"/>
+              </a:rPr>
+              <a:t>head()</a:t>
+            </a:r>
+          </a:p>
+          <a:p>
+            <a:r>
+              <a:rPr lang="en-US" sz="1200" dirty="0" err="1" smtClean="0">
+                <a:latin typeface="Monaco" charset="0"/>
+                <a:ea typeface="Monaco" charset="0"/>
+                <a:cs typeface="Monaco" charset="0"/>
+              </a:rPr>
+              <a:t>str</a:t>
+            </a:r>
+            <a:r>
+              <a:rPr lang="en-US" sz="1200" dirty="0" smtClean="0">
+                <a:latin typeface="Monaco" charset="0"/>
+                <a:ea typeface="Monaco" charset="0"/>
+                <a:cs typeface="Monaco" charset="0"/>
+              </a:rPr>
+              <a:t>()</a:t>
+            </a:r>
+            <a:endParaRPr lang="en-US" sz="1200" dirty="0">
+              <a:latin typeface="Monaco" charset="0"/>
+              <a:ea typeface="Monaco" charset="0"/>
+              <a:cs typeface="Monaco" charset="0"/>
+            </a:endParaRPr>
+          </a:p>
+        </p:txBody>
+      </p:sp>
+      <p:sp>
+        <p:nvSpPr>
+          <p:cNvPr id="25" name="TextBox 24"/>
+          <p:cNvSpPr txBox="1"/>
+          <p:nvPr/>
+        </p:nvSpPr>
+        <p:spPr>
+          <a:xfrm>
+            <a:off x="8090153" y="3213367"/>
+            <a:ext cx="885179" cy="276999"/>
+          </a:xfrm>
+          <a:prstGeom prst="rect">
+            <a:avLst/>
+          </a:prstGeom>
+          <a:noFill/>
+        </p:spPr>
+        <p:txBody>
+          <a:bodyPr wrap="none" rtlCol="0">
+            <a:spAutoFit/>
+          </a:bodyPr>
+          <a:lstStyle/>
+          <a:p>
+            <a:r>
+              <a:rPr lang="en-US" sz="1200" dirty="0" smtClean="0">
+                <a:latin typeface="Monaco" charset="0"/>
+                <a:ea typeface="Monaco" charset="0"/>
+                <a:cs typeface="Monaco" charset="0"/>
+              </a:rPr>
+              <a:t>write.csv()</a:t>
+            </a:r>
+            <a:endParaRPr lang="en-US" sz="1200" dirty="0">
+              <a:latin typeface="Monaco" charset="0"/>
+              <a:ea typeface="Monaco" charset="0"/>
+              <a:cs typeface="Monaco" charset="0"/>
+            </a:endParaRPr>
+          </a:p>
+        </p:txBody>
+      </p:sp>
+      <p:sp>
+        <p:nvSpPr>
+          <p:cNvPr id="26" name="TextBox 25"/>
+          <p:cNvSpPr txBox="1"/>
+          <p:nvPr/>
+        </p:nvSpPr>
+        <p:spPr>
+          <a:xfrm>
+            <a:off x="6350823" y="861234"/>
+            <a:ext cx="2183577" cy="1384995"/>
+          </a:xfrm>
+          <a:prstGeom prst="rect">
+            <a:avLst/>
+          </a:prstGeom>
+          <a:noFill/>
+        </p:spPr>
+        <p:txBody>
+          <a:bodyPr wrap="square" numCol="1" rtlCol="0">
+            <a:spAutoFit/>
+          </a:bodyPr>
+          <a:lstStyle/>
+          <a:p>
+            <a:r>
+              <a:rPr lang="en-US" sz="1200" dirty="0" smtClean="0">
+                <a:latin typeface="Monaco" charset="0"/>
+                <a:ea typeface="Monaco" charset="0"/>
+                <a:cs typeface="Monaco" charset="0"/>
+              </a:rPr>
+              <a:t>plot()</a:t>
+            </a:r>
+          </a:p>
+          <a:p>
+            <a:r>
+              <a:rPr lang="en-US" sz="1200" dirty="0" err="1" smtClean="0">
+                <a:latin typeface="Monaco" charset="0"/>
+                <a:ea typeface="Monaco" charset="0"/>
+                <a:cs typeface="Monaco" charset="0"/>
+              </a:rPr>
+              <a:t>hist</a:t>
+            </a:r>
+            <a:r>
+              <a:rPr lang="en-US" sz="1200" dirty="0" smtClean="0">
+                <a:latin typeface="Monaco" charset="0"/>
+                <a:ea typeface="Monaco" charset="0"/>
+                <a:cs typeface="Monaco" charset="0"/>
+              </a:rPr>
+              <a:t>()</a:t>
+            </a:r>
+          </a:p>
+          <a:p>
+            <a:r>
+              <a:rPr lang="en-US" sz="1200" dirty="0" err="1" smtClean="0">
+                <a:latin typeface="Monaco" charset="0"/>
+                <a:ea typeface="Monaco" charset="0"/>
+                <a:cs typeface="Monaco" charset="0"/>
+              </a:rPr>
+              <a:t>barplot</a:t>
+            </a:r>
+            <a:r>
+              <a:rPr lang="en-US" sz="1200" dirty="0" smtClean="0">
+                <a:latin typeface="Monaco" charset="0"/>
+                <a:ea typeface="Monaco" charset="0"/>
+                <a:cs typeface="Monaco" charset="0"/>
+              </a:rPr>
+              <a:t>()</a:t>
+            </a:r>
+          </a:p>
+          <a:p>
+            <a:r>
+              <a:rPr lang="en-US" sz="1200" dirty="0" smtClean="0">
+                <a:latin typeface="Monaco" charset="0"/>
+                <a:ea typeface="Monaco" charset="0"/>
+                <a:cs typeface="Monaco" charset="0"/>
+              </a:rPr>
+              <a:t>boxplot()</a:t>
+            </a:r>
+          </a:p>
+          <a:p>
+            <a:r>
+              <a:rPr lang="en-US" sz="1200" dirty="0" err="1" smtClean="0">
+                <a:latin typeface="Monaco" charset="0"/>
+                <a:ea typeface="Monaco" charset="0"/>
+                <a:cs typeface="Monaco" charset="0"/>
+              </a:rPr>
+              <a:t>interaction.plot</a:t>
+            </a:r>
+            <a:r>
+              <a:rPr lang="en-US" sz="1200" dirty="0" smtClean="0">
+                <a:latin typeface="Monaco" charset="0"/>
+                <a:ea typeface="Monaco" charset="0"/>
+                <a:cs typeface="Monaco" charset="0"/>
+              </a:rPr>
+              <a:t>()</a:t>
+            </a:r>
+            <a:endParaRPr lang="en-US" sz="1200" dirty="0" smtClean="0">
+              <a:latin typeface="Monaco" charset="0"/>
+              <a:ea typeface="Monaco" charset="0"/>
+              <a:cs typeface="Monaco" charset="0"/>
+            </a:endParaRPr>
+          </a:p>
+          <a:p>
+            <a:r>
+              <a:rPr lang="en-US" sz="1200" dirty="0" smtClean="0">
+                <a:latin typeface="Monaco" charset="0"/>
+                <a:ea typeface="Monaco" charset="0"/>
+                <a:cs typeface="Monaco" charset="0"/>
+              </a:rPr>
+              <a:t>psych::</a:t>
+            </a:r>
+            <a:r>
+              <a:rPr lang="en-US" sz="1200" dirty="0" err="1" smtClean="0">
+                <a:latin typeface="Monaco" charset="0"/>
+                <a:ea typeface="Monaco" charset="0"/>
+                <a:cs typeface="Monaco" charset="0"/>
+              </a:rPr>
+              <a:t>pairs.panels</a:t>
+            </a:r>
+            <a:r>
+              <a:rPr lang="en-US" sz="1200" dirty="0" smtClean="0">
+                <a:latin typeface="Monaco" charset="0"/>
+                <a:ea typeface="Monaco" charset="0"/>
+                <a:cs typeface="Monaco" charset="0"/>
+              </a:rPr>
+              <a:t>()</a:t>
+            </a:r>
+          </a:p>
+          <a:p>
+            <a:r>
+              <a:rPr lang="en-US" sz="1200" dirty="0" smtClean="0">
+                <a:latin typeface="Monaco" charset="0"/>
+                <a:ea typeface="Monaco" charset="0"/>
+                <a:cs typeface="Monaco" charset="0"/>
+              </a:rPr>
+              <a:t>ggplot2::</a:t>
+            </a:r>
+            <a:r>
+              <a:rPr lang="en-US" sz="1200" dirty="0" err="1" smtClean="0">
+                <a:latin typeface="Monaco" charset="0"/>
+                <a:ea typeface="Monaco" charset="0"/>
+                <a:cs typeface="Monaco" charset="0"/>
+              </a:rPr>
+              <a:t>ggplot</a:t>
+            </a:r>
+            <a:r>
+              <a:rPr lang="en-US" sz="1200" dirty="0" smtClean="0">
+                <a:latin typeface="Monaco" charset="0"/>
+                <a:ea typeface="Monaco" charset="0"/>
+                <a:cs typeface="Monaco" charset="0"/>
+              </a:rPr>
+              <a:t>() + </a:t>
+            </a:r>
+            <a:r>
+              <a:rPr lang="en-US" sz="1200" dirty="0" err="1" smtClean="0">
+                <a:latin typeface="Monaco" charset="0"/>
+                <a:ea typeface="Monaco" charset="0"/>
+                <a:cs typeface="Monaco" charset="0"/>
+              </a:rPr>
+              <a:t>geom</a:t>
+            </a:r>
+            <a:r>
+              <a:rPr lang="en-US" sz="1200" dirty="0" smtClean="0">
+                <a:latin typeface="Monaco" charset="0"/>
+                <a:ea typeface="Monaco" charset="0"/>
+                <a:cs typeface="Monaco" charset="0"/>
+              </a:rPr>
+              <a:t>_*()</a:t>
+            </a:r>
+          </a:p>
+        </p:txBody>
+      </p:sp>
+      <p:sp>
+        <p:nvSpPr>
+          <p:cNvPr id="33" name="TextBox 32"/>
+          <p:cNvSpPr txBox="1"/>
+          <p:nvPr/>
+        </p:nvSpPr>
+        <p:spPr>
+          <a:xfrm>
+            <a:off x="4743186" y="1480721"/>
+            <a:ext cx="1233030" cy="1569660"/>
+          </a:xfrm>
+          <a:prstGeom prst="rect">
+            <a:avLst/>
+          </a:prstGeom>
+          <a:noFill/>
+        </p:spPr>
+        <p:txBody>
+          <a:bodyPr wrap="none" rtlCol="0">
+            <a:spAutoFit/>
+          </a:bodyPr>
+          <a:lstStyle/>
+          <a:p>
+            <a:r>
+              <a:rPr lang="en-US" sz="1200" dirty="0" smtClean="0">
+                <a:latin typeface="Monaco" charset="0"/>
+                <a:ea typeface="Monaco" charset="0"/>
+                <a:cs typeface="Monaco" charset="0"/>
+              </a:rPr>
+              <a:t>factor()</a:t>
+            </a:r>
+          </a:p>
+          <a:p>
+            <a:r>
+              <a:rPr lang="en-US" sz="1200" dirty="0">
+                <a:latin typeface="Monaco" charset="0"/>
+                <a:ea typeface="Monaco" charset="0"/>
+                <a:cs typeface="Monaco" charset="0"/>
+              </a:rPr>
+              <a:t>merge()</a:t>
+            </a:r>
+          </a:p>
+          <a:p>
+            <a:r>
+              <a:rPr lang="en-US" sz="1200" dirty="0" err="1" smtClean="0">
+                <a:latin typeface="Monaco" charset="0"/>
+                <a:ea typeface="Monaco" charset="0"/>
+                <a:cs typeface="Monaco" charset="0"/>
+              </a:rPr>
+              <a:t>dplyr</a:t>
+            </a:r>
+            <a:r>
+              <a:rPr lang="en-US" sz="1200" dirty="0" smtClean="0">
+                <a:latin typeface="Monaco" charset="0"/>
+                <a:ea typeface="Monaco" charset="0"/>
+                <a:cs typeface="Monaco" charset="0"/>
+              </a:rPr>
+              <a:t>::select()</a:t>
+            </a:r>
+          </a:p>
+          <a:p>
+            <a:r>
+              <a:rPr lang="en-US" sz="1200" dirty="0" err="1">
+                <a:latin typeface="Monaco" charset="0"/>
+                <a:ea typeface="Monaco" charset="0"/>
+                <a:cs typeface="Monaco" charset="0"/>
+              </a:rPr>
+              <a:t>dplyr</a:t>
+            </a:r>
+            <a:r>
+              <a:rPr lang="en-US" sz="1200" dirty="0" smtClean="0">
+                <a:latin typeface="Monaco" charset="0"/>
+                <a:ea typeface="Monaco" charset="0"/>
+                <a:cs typeface="Monaco" charset="0"/>
+              </a:rPr>
+              <a:t>::filter()</a:t>
+            </a:r>
+            <a:endParaRPr lang="en-US" sz="1200" dirty="0">
+              <a:latin typeface="Monaco" charset="0"/>
+              <a:ea typeface="Monaco" charset="0"/>
+              <a:cs typeface="Monaco" charset="0"/>
+            </a:endParaRPr>
+          </a:p>
+          <a:p>
+            <a:r>
+              <a:rPr lang="en-US" sz="1200" dirty="0" err="1">
+                <a:latin typeface="Monaco" charset="0"/>
+                <a:ea typeface="Monaco" charset="0"/>
+                <a:cs typeface="Monaco" charset="0"/>
+              </a:rPr>
+              <a:t>dplyr</a:t>
+            </a:r>
+            <a:r>
+              <a:rPr lang="en-US" sz="1200" dirty="0" smtClean="0">
+                <a:latin typeface="Monaco" charset="0"/>
+                <a:ea typeface="Monaco" charset="0"/>
+                <a:cs typeface="Monaco" charset="0"/>
+              </a:rPr>
+              <a:t>::mutate()</a:t>
+            </a:r>
+          </a:p>
+          <a:p>
+            <a:r>
+              <a:rPr lang="en-US" sz="1200" dirty="0" err="1">
+                <a:latin typeface="Monaco" charset="0"/>
+                <a:ea typeface="Monaco" charset="0"/>
+                <a:cs typeface="Monaco" charset="0"/>
+              </a:rPr>
+              <a:t>dplyr</a:t>
+            </a:r>
+            <a:r>
+              <a:rPr lang="en-US" sz="1200" dirty="0" smtClean="0">
+                <a:latin typeface="Monaco" charset="0"/>
+                <a:ea typeface="Monaco" charset="0"/>
+                <a:cs typeface="Monaco" charset="0"/>
+              </a:rPr>
+              <a:t>::rename()</a:t>
+            </a:r>
+          </a:p>
+          <a:p>
+            <a:r>
+              <a:rPr lang="en-US" sz="1200" dirty="0" err="1" smtClean="0">
+                <a:latin typeface="Monaco" charset="0"/>
+                <a:ea typeface="Monaco" charset="0"/>
+                <a:cs typeface="Monaco" charset="0"/>
+              </a:rPr>
+              <a:t>dplyr</a:t>
+            </a:r>
+            <a:r>
+              <a:rPr lang="en-US" sz="1200" dirty="0" smtClean="0">
+                <a:latin typeface="Monaco" charset="0"/>
+                <a:ea typeface="Monaco" charset="0"/>
+                <a:cs typeface="Monaco" charset="0"/>
+              </a:rPr>
+              <a:t>::arrange()</a:t>
+            </a:r>
+          </a:p>
+          <a:p>
+            <a:r>
+              <a:rPr lang="en-US" sz="1200" dirty="0" err="1">
+                <a:latin typeface="Monaco" charset="0"/>
+                <a:ea typeface="Monaco" charset="0"/>
+                <a:cs typeface="Monaco" charset="0"/>
+              </a:rPr>
+              <a:t>dplyr</a:t>
+            </a:r>
+            <a:r>
+              <a:rPr lang="en-US" sz="1200" dirty="0" smtClean="0">
+                <a:latin typeface="Monaco" charset="0"/>
+                <a:ea typeface="Monaco" charset="0"/>
+                <a:cs typeface="Monaco" charset="0"/>
+              </a:rPr>
+              <a:t>::join()</a:t>
+            </a:r>
+            <a:endParaRPr lang="en-US" sz="1200" dirty="0">
+              <a:latin typeface="Monaco" charset="0"/>
+              <a:ea typeface="Monaco" charset="0"/>
+              <a:cs typeface="Monaco" charset="0"/>
+            </a:endParaRPr>
+          </a:p>
+        </p:txBody>
+      </p:sp>
+      <p:sp>
+        <p:nvSpPr>
+          <p:cNvPr id="35" name="TextBox 34"/>
+          <p:cNvSpPr txBox="1"/>
+          <p:nvPr/>
+        </p:nvSpPr>
+        <p:spPr>
+          <a:xfrm>
+            <a:off x="2339938" y="4928806"/>
+            <a:ext cx="1045479" cy="369332"/>
+          </a:xfrm>
+          <a:prstGeom prst="rect">
+            <a:avLst/>
+          </a:prstGeom>
+          <a:noFill/>
+        </p:spPr>
+        <p:txBody>
+          <a:bodyPr wrap="none" rtlCol="0">
+            <a:spAutoFit/>
+          </a:bodyPr>
+          <a:lstStyle/>
+          <a:p>
+            <a:r>
+              <a:rPr lang="en-US" b="1" dirty="0" smtClean="0"/>
+              <a:t>Pipelines</a:t>
+            </a:r>
+            <a:endParaRPr lang="en-US" b="1" dirty="0"/>
+          </a:p>
+        </p:txBody>
+      </p:sp>
+      <p:sp>
+        <p:nvSpPr>
+          <p:cNvPr id="36" name="TextBox 35"/>
+          <p:cNvSpPr txBox="1"/>
+          <p:nvPr/>
+        </p:nvSpPr>
+        <p:spPr>
+          <a:xfrm>
+            <a:off x="2339938" y="5243022"/>
+            <a:ext cx="1007263" cy="646331"/>
+          </a:xfrm>
+          <a:prstGeom prst="rect">
+            <a:avLst/>
+          </a:prstGeom>
+          <a:noFill/>
+        </p:spPr>
+        <p:txBody>
+          <a:bodyPr wrap="none" rtlCol="0">
+            <a:spAutoFit/>
+          </a:bodyPr>
+          <a:lstStyle/>
+          <a:p>
+            <a:r>
+              <a:rPr lang="en-AU" sz="1200" dirty="0"/>
+              <a:t>x %&gt;% f(y, </a:t>
+            </a:r>
+            <a:r>
+              <a:rPr lang="en-AU" sz="1200" dirty="0" smtClean="0"/>
+              <a:t>...)</a:t>
+            </a:r>
+          </a:p>
+          <a:p>
+            <a:r>
+              <a:rPr lang="en-AU" sz="1200" dirty="0" smtClean="0">
+                <a:latin typeface="Monaco" charset="0"/>
+                <a:ea typeface="Monaco" charset="0"/>
+                <a:cs typeface="Monaco" charset="0"/>
+              </a:rPr>
+              <a:t>calls</a:t>
+            </a:r>
+          </a:p>
+          <a:p>
+            <a:r>
+              <a:rPr lang="en-AU" sz="1200" dirty="0"/>
+              <a:t>f(x, y, ...)</a:t>
+            </a:r>
+            <a:endParaRPr lang="en-US" sz="1200" dirty="0">
+              <a:latin typeface="Monaco" charset="0"/>
+              <a:ea typeface="Monaco" charset="0"/>
+              <a:cs typeface="Monaco" charset="0"/>
+            </a:endParaRPr>
+          </a:p>
+        </p:txBody>
+      </p:sp>
+      <p:sp>
+        <p:nvSpPr>
+          <p:cNvPr id="37" name="TextBox 36"/>
+          <p:cNvSpPr txBox="1"/>
+          <p:nvPr/>
+        </p:nvSpPr>
+        <p:spPr>
+          <a:xfrm>
+            <a:off x="4743186" y="3213367"/>
+            <a:ext cx="1595739" cy="3416320"/>
+          </a:xfrm>
+          <a:prstGeom prst="rect">
+            <a:avLst/>
+          </a:prstGeom>
+          <a:noFill/>
+        </p:spPr>
+        <p:txBody>
+          <a:bodyPr wrap="square" numCol="1" rtlCol="0">
+            <a:spAutoFit/>
+          </a:bodyPr>
+          <a:lstStyle/>
+          <a:p>
+            <a:r>
+              <a:rPr lang="en-US" sz="1200" dirty="0" smtClean="0">
+                <a:latin typeface="Monaco" charset="0"/>
+                <a:ea typeface="Monaco" charset="0"/>
+                <a:cs typeface="Monaco" charset="0"/>
+              </a:rPr>
+              <a:t>summary()</a:t>
+            </a:r>
+          </a:p>
+          <a:p>
+            <a:r>
+              <a:rPr lang="en-US" sz="1200" dirty="0" smtClean="0">
+                <a:latin typeface="Monaco" charset="0"/>
+                <a:ea typeface="Monaco" charset="0"/>
+                <a:cs typeface="Monaco" charset="0"/>
+              </a:rPr>
+              <a:t>psych::describe()</a:t>
+            </a:r>
+            <a:endParaRPr lang="en-US" sz="1200" dirty="0" smtClean="0">
+              <a:latin typeface="Monaco" charset="0"/>
+              <a:ea typeface="Monaco" charset="0"/>
+              <a:cs typeface="Monaco" charset="0"/>
+            </a:endParaRPr>
+          </a:p>
+          <a:p>
+            <a:r>
+              <a:rPr lang="en-US" sz="1200" dirty="0">
+                <a:latin typeface="Monaco" charset="0"/>
+                <a:ea typeface="Monaco" charset="0"/>
+                <a:cs typeface="Monaco" charset="0"/>
+              </a:rPr>
+              <a:t>psych::</a:t>
+            </a:r>
+            <a:r>
+              <a:rPr lang="en-US" sz="1200" dirty="0" err="1" smtClean="0">
+                <a:latin typeface="Monaco" charset="0"/>
+                <a:ea typeface="Monaco" charset="0"/>
+                <a:cs typeface="Monaco" charset="0"/>
+              </a:rPr>
+              <a:t>describeBy</a:t>
+            </a:r>
+            <a:r>
+              <a:rPr lang="en-US" sz="1200" dirty="0" smtClean="0">
+                <a:latin typeface="Monaco" charset="0"/>
+                <a:ea typeface="Monaco" charset="0"/>
+                <a:cs typeface="Monaco" charset="0"/>
+              </a:rPr>
+              <a:t>()</a:t>
+            </a:r>
+            <a:endParaRPr lang="en-US" sz="1200" dirty="0" smtClean="0">
+              <a:latin typeface="Monaco" charset="0"/>
+              <a:ea typeface="Monaco" charset="0"/>
+              <a:cs typeface="Monaco" charset="0"/>
+            </a:endParaRPr>
+          </a:p>
+          <a:p>
+            <a:r>
+              <a:rPr lang="en-US" sz="1200" dirty="0" smtClean="0">
+                <a:latin typeface="Monaco" charset="0"/>
+                <a:ea typeface="Monaco" charset="0"/>
+                <a:cs typeface="Monaco" charset="0"/>
+              </a:rPr>
+              <a:t>table()</a:t>
+            </a:r>
+          </a:p>
+          <a:p>
+            <a:r>
+              <a:rPr lang="en-US" sz="1200" dirty="0" err="1" smtClean="0">
+                <a:latin typeface="Monaco" charset="0"/>
+                <a:ea typeface="Monaco" charset="0"/>
+                <a:cs typeface="Monaco" charset="0"/>
+              </a:rPr>
+              <a:t>prop.table</a:t>
+            </a:r>
+            <a:r>
+              <a:rPr lang="en-US" sz="1200" dirty="0" smtClean="0">
+                <a:latin typeface="Monaco" charset="0"/>
+                <a:ea typeface="Monaco" charset="0"/>
+                <a:cs typeface="Monaco" charset="0"/>
+              </a:rPr>
+              <a:t>()</a:t>
+            </a:r>
+            <a:endParaRPr lang="en-US" sz="1200" dirty="0" smtClean="0">
+              <a:latin typeface="Monaco" charset="0"/>
+              <a:ea typeface="Monaco" charset="0"/>
+              <a:cs typeface="Monaco" charset="0"/>
+            </a:endParaRPr>
+          </a:p>
+          <a:p>
+            <a:r>
+              <a:rPr lang="en-US" sz="1200" dirty="0" err="1" smtClean="0">
+                <a:latin typeface="Monaco" charset="0"/>
+                <a:ea typeface="Monaco" charset="0"/>
+                <a:cs typeface="Monaco" charset="0"/>
+              </a:rPr>
+              <a:t>dplyr</a:t>
+            </a:r>
+            <a:r>
+              <a:rPr lang="en-US" sz="1200" dirty="0" smtClean="0">
+                <a:latin typeface="Monaco" charset="0"/>
+                <a:ea typeface="Monaco" charset="0"/>
+                <a:cs typeface="Monaco" charset="0"/>
+              </a:rPr>
+              <a:t>::</a:t>
+            </a:r>
+            <a:r>
+              <a:rPr lang="en-US" sz="1200" dirty="0" err="1" smtClean="0">
+                <a:latin typeface="Monaco" charset="0"/>
+                <a:ea typeface="Monaco" charset="0"/>
+                <a:cs typeface="Monaco" charset="0"/>
+              </a:rPr>
+              <a:t>group_by</a:t>
+            </a:r>
+            <a:r>
+              <a:rPr lang="en-US" sz="1200" dirty="0" smtClean="0">
+                <a:latin typeface="Monaco" charset="0"/>
+                <a:ea typeface="Monaco" charset="0"/>
+                <a:cs typeface="Monaco" charset="0"/>
+              </a:rPr>
+              <a:t>()</a:t>
+            </a:r>
+          </a:p>
+          <a:p>
+            <a:r>
+              <a:rPr lang="en-US" sz="1200" dirty="0" err="1">
+                <a:latin typeface="Monaco" charset="0"/>
+                <a:ea typeface="Monaco" charset="0"/>
+                <a:cs typeface="Monaco" charset="0"/>
+              </a:rPr>
+              <a:t>dplyr</a:t>
+            </a:r>
+            <a:r>
+              <a:rPr lang="en-US" sz="1200" dirty="0" smtClean="0">
+                <a:latin typeface="Monaco" charset="0"/>
+                <a:ea typeface="Monaco" charset="0"/>
+                <a:cs typeface="Monaco" charset="0"/>
+              </a:rPr>
+              <a:t>::</a:t>
+            </a:r>
+            <a:r>
+              <a:rPr lang="en-US" sz="1200" dirty="0" err="1" smtClean="0">
+                <a:latin typeface="Monaco" charset="0"/>
+                <a:ea typeface="Monaco" charset="0"/>
+                <a:cs typeface="Monaco" charset="0"/>
+              </a:rPr>
+              <a:t>summarise</a:t>
+            </a:r>
+            <a:r>
+              <a:rPr lang="en-US" sz="1200" dirty="0" smtClean="0">
+                <a:latin typeface="Monaco" charset="0"/>
+                <a:ea typeface="Monaco" charset="0"/>
+                <a:cs typeface="Monaco" charset="0"/>
+              </a:rPr>
+              <a:t>()</a:t>
+            </a:r>
+            <a:endParaRPr lang="en-US" sz="1200" dirty="0">
+              <a:latin typeface="Monaco" charset="0"/>
+              <a:ea typeface="Monaco" charset="0"/>
+              <a:cs typeface="Monaco" charset="0"/>
+            </a:endParaRPr>
+          </a:p>
+          <a:p>
+            <a:r>
+              <a:rPr lang="en-US" sz="1200" dirty="0" err="1">
+                <a:latin typeface="Monaco" charset="0"/>
+                <a:ea typeface="Monaco" charset="0"/>
+                <a:cs typeface="Monaco" charset="0"/>
+              </a:rPr>
+              <a:t>dplyr</a:t>
+            </a:r>
+            <a:r>
+              <a:rPr lang="en-US" sz="1200" dirty="0" smtClean="0">
+                <a:latin typeface="Monaco" charset="0"/>
+                <a:ea typeface="Monaco" charset="0"/>
+                <a:cs typeface="Monaco" charset="0"/>
+              </a:rPr>
+              <a:t>::n()</a:t>
+            </a:r>
+            <a:endParaRPr lang="en-US" sz="1200" dirty="0">
+              <a:latin typeface="Monaco" charset="0"/>
+              <a:ea typeface="Monaco" charset="0"/>
+              <a:cs typeface="Monaco" charset="0"/>
+            </a:endParaRPr>
+          </a:p>
+          <a:p>
+            <a:r>
+              <a:rPr lang="en-US" sz="1200" dirty="0" smtClean="0">
+                <a:latin typeface="Monaco" charset="0"/>
+                <a:ea typeface="Monaco" charset="0"/>
+                <a:cs typeface="Monaco" charset="0"/>
+              </a:rPr>
+              <a:t>mean()</a:t>
+            </a:r>
+          </a:p>
+          <a:p>
+            <a:r>
+              <a:rPr lang="en-US" sz="1200" dirty="0" smtClean="0">
+                <a:latin typeface="Monaco" charset="0"/>
+                <a:ea typeface="Monaco" charset="0"/>
+                <a:cs typeface="Monaco" charset="0"/>
+              </a:rPr>
+              <a:t>median()</a:t>
+            </a:r>
+          </a:p>
+          <a:p>
+            <a:r>
+              <a:rPr lang="en-US" sz="1200" dirty="0" smtClean="0">
+                <a:latin typeface="Monaco" charset="0"/>
+                <a:ea typeface="Monaco" charset="0"/>
+                <a:cs typeface="Monaco" charset="0"/>
+              </a:rPr>
+              <a:t>min()</a:t>
+            </a:r>
+          </a:p>
+          <a:p>
+            <a:r>
+              <a:rPr lang="en-US" sz="1200" dirty="0" smtClean="0">
+                <a:latin typeface="Monaco" charset="0"/>
+                <a:ea typeface="Monaco" charset="0"/>
+                <a:cs typeface="Monaco" charset="0"/>
+              </a:rPr>
+              <a:t>max()</a:t>
+            </a:r>
+            <a:endParaRPr lang="en-US" sz="1200" dirty="0">
+              <a:latin typeface="Monaco" charset="0"/>
+              <a:ea typeface="Monaco" charset="0"/>
+              <a:cs typeface="Monaco" charset="0"/>
+            </a:endParaRPr>
+          </a:p>
+          <a:p>
+            <a:r>
+              <a:rPr lang="en-US" sz="1200" dirty="0" smtClean="0">
+                <a:latin typeface="Monaco" charset="0"/>
+                <a:ea typeface="Monaco" charset="0"/>
+                <a:cs typeface="Monaco" charset="0"/>
+              </a:rPr>
+              <a:t>quantile()</a:t>
+            </a:r>
+          </a:p>
+          <a:p>
+            <a:r>
+              <a:rPr lang="en-US" sz="1200" dirty="0" smtClean="0">
+                <a:latin typeface="Monaco" charset="0"/>
+                <a:ea typeface="Monaco" charset="0"/>
+                <a:cs typeface="Monaco" charset="0"/>
+              </a:rPr>
+              <a:t>range()</a:t>
+            </a:r>
+          </a:p>
+          <a:p>
+            <a:r>
+              <a:rPr lang="en-US" sz="1200" dirty="0" err="1" smtClean="0">
+                <a:latin typeface="Monaco" charset="0"/>
+                <a:ea typeface="Monaco" charset="0"/>
+                <a:cs typeface="Monaco" charset="0"/>
+              </a:rPr>
+              <a:t>var</a:t>
+            </a:r>
+            <a:r>
+              <a:rPr lang="en-US" sz="1200" dirty="0" smtClean="0">
+                <a:latin typeface="Monaco" charset="0"/>
+                <a:ea typeface="Monaco" charset="0"/>
+                <a:cs typeface="Monaco" charset="0"/>
+              </a:rPr>
+              <a:t>()</a:t>
+            </a:r>
+          </a:p>
+          <a:p>
+            <a:r>
+              <a:rPr lang="en-US" sz="1200" dirty="0" err="1" smtClean="0">
+                <a:latin typeface="Monaco" charset="0"/>
+                <a:ea typeface="Monaco" charset="0"/>
+                <a:cs typeface="Monaco" charset="0"/>
+              </a:rPr>
+              <a:t>sd</a:t>
+            </a:r>
+            <a:r>
+              <a:rPr lang="en-US" sz="1200" dirty="0" smtClean="0">
+                <a:latin typeface="Monaco" charset="0"/>
+                <a:ea typeface="Monaco" charset="0"/>
+                <a:cs typeface="Monaco" charset="0"/>
+              </a:rPr>
+              <a:t>()</a:t>
+            </a:r>
+          </a:p>
+          <a:p>
+            <a:r>
+              <a:rPr lang="en-US" sz="1200" dirty="0" smtClean="0">
+                <a:latin typeface="Monaco" charset="0"/>
+                <a:ea typeface="Monaco" charset="0"/>
+                <a:cs typeface="Monaco" charset="0"/>
+              </a:rPr>
+              <a:t>sum()</a:t>
+            </a:r>
+          </a:p>
+          <a:p>
+            <a:endParaRPr lang="en-US" sz="1200" dirty="0" smtClean="0">
+              <a:latin typeface="Monaco" charset="0"/>
+              <a:ea typeface="Monaco" charset="0"/>
+              <a:cs typeface="Monaco" charset="0"/>
+            </a:endParaRPr>
+          </a:p>
+        </p:txBody>
+      </p:sp>
+      <p:sp>
+        <p:nvSpPr>
+          <p:cNvPr id="38" name="TextBox 37"/>
+          <p:cNvSpPr txBox="1"/>
+          <p:nvPr/>
+        </p:nvSpPr>
+        <p:spPr>
+          <a:xfrm>
+            <a:off x="6450834" y="4027309"/>
+            <a:ext cx="1451038" cy="2123658"/>
+          </a:xfrm>
+          <a:prstGeom prst="rect">
+            <a:avLst/>
+          </a:prstGeom>
+          <a:noFill/>
+        </p:spPr>
+        <p:txBody>
+          <a:bodyPr wrap="none" rtlCol="0">
+            <a:spAutoFit/>
+          </a:bodyPr>
+          <a:lstStyle/>
+          <a:p>
+            <a:r>
+              <a:rPr lang="en-US" sz="1200" dirty="0" err="1" smtClean="0">
+                <a:latin typeface="Monaco" charset="0"/>
+                <a:ea typeface="Monaco" charset="0"/>
+                <a:cs typeface="Monaco" charset="0"/>
+              </a:rPr>
+              <a:t>t.test</a:t>
+            </a:r>
+            <a:r>
+              <a:rPr lang="en-US" sz="1200" dirty="0" smtClean="0">
+                <a:latin typeface="Monaco" charset="0"/>
+                <a:ea typeface="Monaco" charset="0"/>
+                <a:cs typeface="Monaco" charset="0"/>
+              </a:rPr>
+              <a:t>()</a:t>
+            </a:r>
+          </a:p>
+          <a:p>
+            <a:r>
+              <a:rPr lang="en-US" sz="1200" dirty="0" err="1" smtClean="0">
+                <a:latin typeface="Monaco" charset="0"/>
+                <a:ea typeface="Monaco" charset="0"/>
+                <a:cs typeface="Monaco" charset="0"/>
+              </a:rPr>
+              <a:t>aov</a:t>
+            </a:r>
+            <a:r>
+              <a:rPr lang="en-US" sz="1200" dirty="0" smtClean="0">
+                <a:latin typeface="Monaco" charset="0"/>
+                <a:ea typeface="Monaco" charset="0"/>
+                <a:cs typeface="Monaco" charset="0"/>
+              </a:rPr>
+              <a:t>()</a:t>
+            </a:r>
+          </a:p>
+          <a:p>
+            <a:pPr marL="171450" indent="-171450">
+              <a:buFont typeface="Arial" panose="020B0604020202020204" pitchFamily="34" charset="0"/>
+              <a:buChar char="•"/>
+            </a:pPr>
+            <a:r>
+              <a:rPr lang="en-US" sz="1200" dirty="0" err="1" smtClean="0">
+                <a:latin typeface="Monaco" charset="0"/>
+                <a:ea typeface="Monaco" charset="0"/>
+                <a:cs typeface="Monaco" charset="0"/>
+              </a:rPr>
+              <a:t>model.tables</a:t>
+            </a:r>
+            <a:r>
+              <a:rPr lang="en-US" sz="1200" dirty="0" smtClean="0">
+                <a:latin typeface="Monaco" charset="0"/>
+                <a:ea typeface="Monaco" charset="0"/>
+                <a:cs typeface="Monaco" charset="0"/>
+              </a:rPr>
+              <a:t>()</a:t>
+            </a:r>
+          </a:p>
+          <a:p>
+            <a:r>
+              <a:rPr lang="en-US" sz="1200" dirty="0" err="1" smtClean="0">
+                <a:latin typeface="Monaco" charset="0"/>
+                <a:ea typeface="Monaco" charset="0"/>
+                <a:cs typeface="Monaco" charset="0"/>
+              </a:rPr>
+              <a:t>cor</a:t>
+            </a:r>
+            <a:r>
+              <a:rPr lang="en-US" sz="1200" dirty="0" smtClean="0">
+                <a:latin typeface="Monaco" charset="0"/>
+                <a:ea typeface="Monaco" charset="0"/>
+                <a:cs typeface="Monaco" charset="0"/>
+              </a:rPr>
+              <a:t>()</a:t>
+            </a:r>
+          </a:p>
+          <a:p>
+            <a:r>
+              <a:rPr lang="en-US" sz="1200" dirty="0" smtClean="0">
+                <a:latin typeface="Monaco" charset="0"/>
+                <a:ea typeface="Monaco" charset="0"/>
+                <a:cs typeface="Monaco" charset="0"/>
+              </a:rPr>
+              <a:t>psych::</a:t>
+            </a:r>
+            <a:r>
+              <a:rPr lang="en-US" sz="1200" dirty="0" err="1" smtClean="0">
+                <a:latin typeface="Monaco" charset="0"/>
+                <a:ea typeface="Monaco" charset="0"/>
+                <a:cs typeface="Monaco" charset="0"/>
+              </a:rPr>
+              <a:t>corr.test</a:t>
+            </a:r>
+            <a:r>
+              <a:rPr lang="en-US" sz="1200" dirty="0" smtClean="0">
+                <a:latin typeface="Monaco" charset="0"/>
+                <a:ea typeface="Monaco" charset="0"/>
+                <a:cs typeface="Monaco" charset="0"/>
+              </a:rPr>
+              <a:t>()</a:t>
+            </a:r>
+          </a:p>
+          <a:p>
+            <a:r>
+              <a:rPr lang="en-US" sz="1200" dirty="0" smtClean="0">
+                <a:latin typeface="Monaco" charset="0"/>
+                <a:ea typeface="Monaco" charset="0"/>
+                <a:cs typeface="Monaco" charset="0"/>
+              </a:rPr>
+              <a:t>lm()</a:t>
+            </a:r>
+          </a:p>
+          <a:p>
+            <a:pPr marL="171450" indent="-171450">
+              <a:buFont typeface="Arial" panose="020B0604020202020204" pitchFamily="34" charset="0"/>
+              <a:buChar char="•"/>
+            </a:pPr>
+            <a:r>
+              <a:rPr lang="en-US" sz="1200" dirty="0" err="1" smtClean="0">
+                <a:latin typeface="Monaco" charset="0"/>
+                <a:ea typeface="Monaco" charset="0"/>
+                <a:cs typeface="Monaco" charset="0"/>
+              </a:rPr>
+              <a:t>anova</a:t>
+            </a:r>
+            <a:r>
+              <a:rPr lang="en-US" sz="1200" dirty="0" smtClean="0">
+                <a:latin typeface="Monaco" charset="0"/>
+                <a:ea typeface="Monaco" charset="0"/>
+                <a:cs typeface="Monaco" charset="0"/>
+              </a:rPr>
+              <a:t>()</a:t>
+            </a:r>
+          </a:p>
+          <a:p>
+            <a:pPr marL="171450" indent="-171450">
+              <a:buFont typeface="Arial" panose="020B0604020202020204" pitchFamily="34" charset="0"/>
+              <a:buChar char="•"/>
+            </a:pPr>
+            <a:r>
+              <a:rPr lang="en-US" sz="1200" dirty="0" smtClean="0">
+                <a:latin typeface="Monaco" charset="0"/>
+                <a:ea typeface="Monaco" charset="0"/>
+                <a:cs typeface="Monaco" charset="0"/>
+              </a:rPr>
+              <a:t>predict()</a:t>
+            </a:r>
+          </a:p>
+          <a:p>
+            <a:pPr marL="171450" indent="-171450">
+              <a:buFont typeface="Arial" panose="020B0604020202020204" pitchFamily="34" charset="0"/>
+              <a:buChar char="•"/>
+            </a:pPr>
+            <a:r>
+              <a:rPr lang="en-US" sz="1200" dirty="0" smtClean="0">
+                <a:latin typeface="Monaco" charset="0"/>
+                <a:ea typeface="Monaco" charset="0"/>
+                <a:cs typeface="Monaco" charset="0"/>
+              </a:rPr>
+              <a:t>residuals()</a:t>
+            </a:r>
+          </a:p>
+          <a:p>
+            <a:pPr marL="171450" indent="-171450">
+              <a:buFont typeface="Arial" panose="020B0604020202020204" pitchFamily="34" charset="0"/>
+              <a:buChar char="•"/>
+            </a:pPr>
+            <a:r>
+              <a:rPr lang="en-US" sz="1200" dirty="0" err="1" smtClean="0">
+                <a:latin typeface="Monaco" charset="0"/>
+                <a:ea typeface="Monaco" charset="0"/>
+                <a:cs typeface="Monaco" charset="0"/>
+              </a:rPr>
+              <a:t>lm.beta</a:t>
+            </a:r>
+            <a:r>
+              <a:rPr lang="en-US" sz="1200" dirty="0" smtClean="0">
+                <a:latin typeface="Monaco" charset="0"/>
+                <a:ea typeface="Monaco" charset="0"/>
+                <a:cs typeface="Monaco" charset="0"/>
+              </a:rPr>
+              <a:t>::</a:t>
+            </a:r>
+            <a:r>
+              <a:rPr lang="en-US" sz="1200" dirty="0" err="1" smtClean="0">
+                <a:latin typeface="Monaco" charset="0"/>
+                <a:ea typeface="Monaco" charset="0"/>
+                <a:cs typeface="Monaco" charset="0"/>
+              </a:rPr>
+              <a:t>lm.beta</a:t>
+            </a:r>
+            <a:endParaRPr lang="en-US" sz="1200" dirty="0" smtClean="0">
+              <a:latin typeface="Monaco" charset="0"/>
+              <a:ea typeface="Monaco" charset="0"/>
+              <a:cs typeface="Monaco" charset="0"/>
+            </a:endParaRPr>
+          </a:p>
+          <a:p>
+            <a:r>
+              <a:rPr lang="en-US" sz="1200" dirty="0" err="1" smtClean="0">
+                <a:latin typeface="Monaco" charset="0"/>
+                <a:ea typeface="Monaco" charset="0"/>
+                <a:cs typeface="Monaco" charset="0"/>
+              </a:rPr>
+              <a:t>glm</a:t>
+            </a:r>
+            <a:r>
+              <a:rPr lang="en-US" sz="1200" dirty="0" smtClean="0">
+                <a:latin typeface="Monaco" charset="0"/>
+                <a:ea typeface="Monaco" charset="0"/>
+                <a:cs typeface="Monaco" charset="0"/>
+              </a:rPr>
+              <a:t>()</a:t>
+            </a:r>
+            <a:endParaRPr lang="en-US" sz="1200" dirty="0">
+              <a:latin typeface="Monaco" charset="0"/>
+              <a:ea typeface="Monaco" charset="0"/>
+              <a:cs typeface="Monaco" charset="0"/>
+            </a:endParaRPr>
+          </a:p>
+        </p:txBody>
+      </p:sp>
     </p:spTree>
     <p:extLst>
       <p:ext uri="{BB962C8B-B14F-4D97-AF65-F5344CB8AC3E}">
-        <p14:creationId xmlns:p14="http://schemas.microsoft.com/office/powerpoint/2010/main" val="1907704606"/>
+        <p14:creationId xmlns:p14="http://schemas.microsoft.com/office/powerpoint/2010/main" val="3440306015"/>
       </p:ext>
     </p:extLst>
   </p:cSld>

</xml_diff>